<commit_message>
Change style of documentation
</commit_message>
<xml_diff>
--- a/Presentation.pptx
+++ b/Presentation.pptx
@@ -21,35 +21,39 @@
   <p:notesSz cx="6858000" cy="9144000"/>
   <p:embeddedFontLst>
     <p:embeddedFont>
+      <p:font typeface="Bahnschrift SemiLight Condensed" panose="020B0502040204020203" pitchFamily="34" charset="0"/>
+      <p:regular r:id="rId11"/>
+    </p:embeddedFont>
+    <p:embeddedFont>
       <p:font typeface="Frank Ruhl Libre Medium" panose="00000600000000000000" pitchFamily="2" charset="-79"/>
-      <p:regular r:id="rId11"/>
-      <p:bold r:id="rId12"/>
+      <p:regular r:id="rId12"/>
+      <p:bold r:id="rId13"/>
     </p:embeddedFont>
     <p:embeddedFont>
       <p:font typeface="Lato Light" panose="020F0502020204030203" pitchFamily="34" charset="0"/>
-      <p:regular r:id="rId13"/>
-      <p:bold r:id="rId14"/>
-      <p:italic r:id="rId15"/>
-      <p:boldItalic r:id="rId16"/>
+      <p:regular r:id="rId14"/>
+      <p:bold r:id="rId15"/>
+      <p:italic r:id="rId16"/>
+      <p:boldItalic r:id="rId17"/>
     </p:embeddedFont>
     <p:embeddedFont>
       <p:font typeface="Oswald Medium" panose="00000600000000000000" pitchFamily="2" charset="-52"/>
-      <p:regular r:id="rId17"/>
-      <p:bold r:id="rId18"/>
+      <p:regular r:id="rId18"/>
+      <p:bold r:id="rId19"/>
     </p:embeddedFont>
     <p:embeddedFont>
       <p:font typeface="Roboto" panose="02000000000000000000" pitchFamily="2" charset="0"/>
-      <p:regular r:id="rId19"/>
-      <p:bold r:id="rId20"/>
-      <p:italic r:id="rId21"/>
-      <p:boldItalic r:id="rId22"/>
+      <p:regular r:id="rId20"/>
+      <p:bold r:id="rId21"/>
+      <p:italic r:id="rId22"/>
+      <p:boldItalic r:id="rId23"/>
     </p:embeddedFont>
     <p:embeddedFont>
       <p:font typeface="Roboto Medium" panose="02000000000000000000" pitchFamily="2" charset="0"/>
-      <p:regular r:id="rId23"/>
-      <p:bold r:id="rId24"/>
-      <p:italic r:id="rId25"/>
-      <p:boldItalic r:id="rId26"/>
+      <p:regular r:id="rId24"/>
+      <p:bold r:id="rId25"/>
+      <p:italic r:id="rId26"/>
+      <p:boldItalic r:id="rId27"/>
     </p:embeddedFont>
   </p:embeddedFontLst>
   <p:defaultTextStyle>
@@ -281,6 +285,11 @@
       </a:defRPr>
     </a:lvl9pPr>
   </p:defaultTextStyle>
+  <p:extLst>
+    <p:ext uri="{EFAFB233-063F-42B5-8137-9DF3F51BA10A}">
+      <p15:sldGuideLst xmlns:p15="http://schemas.microsoft.com/office/powerpoint/2012/main"/>
+    </p:ext>
+  </p:extLst>
 </p:presentation>
 </file>
 
@@ -9052,56 +9061,6 @@
           <a:chExt cx="0" cy="0"/>
         </a:xfrm>
       </p:grpSpPr>
-      <p:sp>
-        <p:nvSpPr>
-          <p:cNvPr id="172" name="Google Shape;172;p28"/>
-          <p:cNvSpPr txBox="1">
-            <a:spLocks noGrp="1"/>
-          </p:cNvSpPr>
-          <p:nvPr>
-            <p:ph type="ctrTitle"/>
-          </p:nvPr>
-        </p:nvSpPr>
-        <p:spPr>
-          <a:xfrm>
-            <a:off x="1487550" y="1370346"/>
-            <a:ext cx="6168900" cy="869700"/>
-          </a:xfrm>
-          <a:prstGeom prst="rect">
-            <a:avLst/>
-          </a:prstGeom>
-        </p:spPr>
-        <p:txBody>
-          <a:bodyPr spcFirstLastPara="1" wrap="square" lIns="91425" tIns="91425" rIns="91425" bIns="91425" anchor="b" anchorCtr="0">
-            <a:noAutofit/>
-          </a:bodyPr>
-          <a:lstStyle/>
-          <a:p>
-            <a:pPr marL="0" lvl="0" indent="0" algn="ctr" rtl="0">
-              <a:spcBef>
-                <a:spcPts val="0"/>
-              </a:spcBef>
-              <a:spcAft>
-                <a:spcPts val="0"/>
-              </a:spcAft>
-              <a:buNone/>
-            </a:pPr>
-            <a:r>
-              <a:rPr lang="en" dirty="0">
-                <a:solidFill>
-                  <a:schemeClr val="accent3"/>
-                </a:solidFill>
-              </a:rPr>
-              <a:t>Bargain</a:t>
-            </a:r>
-            <a:endParaRPr dirty="0">
-              <a:solidFill>
-                <a:srgbClr val="FFFFFF"/>
-              </a:solidFill>
-            </a:endParaRPr>
-          </a:p>
-        </p:txBody>
-      </p:sp>
       <p:pic>
         <p:nvPicPr>
           <p:cNvPr id="2" name="Picture 2">
@@ -9149,6 +9108,303 @@
           </a:extLst>
         </p:spPr>
       </p:pic>
+      <p:sp>
+        <p:nvSpPr>
+          <p:cNvPr id="6" name="Title 1">
+            <a:extLst>
+              <a:ext uri="{FF2B5EF4-FFF2-40B4-BE49-F238E27FC236}">
+                <a16:creationId xmlns:a16="http://schemas.microsoft.com/office/drawing/2014/main" id="{36C1124A-9015-4CF9-B602-0C489647878A}"/>
+              </a:ext>
+            </a:extLst>
+          </p:cNvPr>
+          <p:cNvSpPr txBox="1">
+            <a:spLocks/>
+          </p:cNvSpPr>
+          <p:nvPr/>
+        </p:nvSpPr>
+        <p:spPr>
+          <a:xfrm>
+            <a:off x="2238463" y="389160"/>
+            <a:ext cx="8175812" cy="1742905"/>
+          </a:xfrm>
+          <a:prstGeom prst="rect">
+            <a:avLst/>
+          </a:prstGeom>
+          <a:noFill/>
+          <a:ln>
+            <a:noFill/>
+          </a:ln>
+        </p:spPr>
+        <p:txBody>
+          <a:bodyPr spcFirstLastPara="1" wrap="square" lIns="91425" tIns="91425" rIns="91425" bIns="91425" anchor="t" anchorCtr="0">
+            <a:noAutofit/>
+          </a:bodyPr>
+          <a:lstStyle>
+            <a:defPPr marR="0" lvl="0" algn="l" rtl="0">
+              <a:lnSpc>
+                <a:spcPct val="100000"/>
+              </a:lnSpc>
+              <a:spcBef>
+                <a:spcPts val="0"/>
+              </a:spcBef>
+              <a:spcAft>
+                <a:spcPts val="0"/>
+              </a:spcAft>
+            </a:defPPr>
+            <a:lvl1pPr marR="0" lvl="0" algn="l" rtl="0">
+              <a:lnSpc>
+                <a:spcPct val="100000"/>
+              </a:lnSpc>
+              <a:spcBef>
+                <a:spcPts val="0"/>
+              </a:spcBef>
+              <a:spcAft>
+                <a:spcPts val="0"/>
+              </a:spcAft>
+              <a:buClr>
+                <a:schemeClr val="accent3"/>
+              </a:buClr>
+              <a:buSzPts val="2800"/>
+              <a:buFont typeface="Oswald Medium"/>
+              <a:buNone/>
+              <a:defRPr sz="2800" b="0" i="0" u="none" strike="noStrike" cap="none">
+                <a:solidFill>
+                  <a:schemeClr val="accent3"/>
+                </a:solidFill>
+                <a:latin typeface="Oswald Medium"/>
+                <a:ea typeface="Oswald Medium"/>
+                <a:cs typeface="Oswald Medium"/>
+                <a:sym typeface="Oswald Medium"/>
+              </a:defRPr>
+            </a:lvl1pPr>
+            <a:lvl2pPr marR="0" lvl="1" algn="l" rtl="0">
+              <a:lnSpc>
+                <a:spcPct val="100000"/>
+              </a:lnSpc>
+              <a:spcBef>
+                <a:spcPts val="0"/>
+              </a:spcBef>
+              <a:spcAft>
+                <a:spcPts val="0"/>
+              </a:spcAft>
+              <a:buClr>
+                <a:schemeClr val="accent3"/>
+              </a:buClr>
+              <a:buSzPts val="2800"/>
+              <a:buFont typeface="Frank Ruhl Libre Medium"/>
+              <a:buNone/>
+              <a:defRPr sz="2800" b="0" i="0" u="none" strike="noStrike" cap="none">
+                <a:solidFill>
+                  <a:schemeClr val="accent3"/>
+                </a:solidFill>
+                <a:latin typeface="Frank Ruhl Libre Medium"/>
+                <a:ea typeface="Frank Ruhl Libre Medium"/>
+                <a:cs typeface="Frank Ruhl Libre Medium"/>
+                <a:sym typeface="Frank Ruhl Libre Medium"/>
+              </a:defRPr>
+            </a:lvl2pPr>
+            <a:lvl3pPr marR="0" lvl="2" algn="l" rtl="0">
+              <a:lnSpc>
+                <a:spcPct val="100000"/>
+              </a:lnSpc>
+              <a:spcBef>
+                <a:spcPts val="0"/>
+              </a:spcBef>
+              <a:spcAft>
+                <a:spcPts val="0"/>
+              </a:spcAft>
+              <a:buClr>
+                <a:schemeClr val="accent3"/>
+              </a:buClr>
+              <a:buSzPts val="2800"/>
+              <a:buFont typeface="Frank Ruhl Libre Medium"/>
+              <a:buNone/>
+              <a:defRPr sz="2800" b="0" i="0" u="none" strike="noStrike" cap="none">
+                <a:solidFill>
+                  <a:schemeClr val="accent3"/>
+                </a:solidFill>
+                <a:latin typeface="Frank Ruhl Libre Medium"/>
+                <a:ea typeface="Frank Ruhl Libre Medium"/>
+                <a:cs typeface="Frank Ruhl Libre Medium"/>
+                <a:sym typeface="Frank Ruhl Libre Medium"/>
+              </a:defRPr>
+            </a:lvl3pPr>
+            <a:lvl4pPr marR="0" lvl="3" algn="l" rtl="0">
+              <a:lnSpc>
+                <a:spcPct val="100000"/>
+              </a:lnSpc>
+              <a:spcBef>
+                <a:spcPts val="0"/>
+              </a:spcBef>
+              <a:spcAft>
+                <a:spcPts val="0"/>
+              </a:spcAft>
+              <a:buClr>
+                <a:schemeClr val="accent3"/>
+              </a:buClr>
+              <a:buSzPts val="2800"/>
+              <a:buFont typeface="Frank Ruhl Libre Medium"/>
+              <a:buNone/>
+              <a:defRPr sz="2800" b="0" i="0" u="none" strike="noStrike" cap="none">
+                <a:solidFill>
+                  <a:schemeClr val="accent3"/>
+                </a:solidFill>
+                <a:latin typeface="Frank Ruhl Libre Medium"/>
+                <a:ea typeface="Frank Ruhl Libre Medium"/>
+                <a:cs typeface="Frank Ruhl Libre Medium"/>
+                <a:sym typeface="Frank Ruhl Libre Medium"/>
+              </a:defRPr>
+            </a:lvl4pPr>
+            <a:lvl5pPr marR="0" lvl="4" algn="l" rtl="0">
+              <a:lnSpc>
+                <a:spcPct val="100000"/>
+              </a:lnSpc>
+              <a:spcBef>
+                <a:spcPts val="0"/>
+              </a:spcBef>
+              <a:spcAft>
+                <a:spcPts val="0"/>
+              </a:spcAft>
+              <a:buClr>
+                <a:schemeClr val="accent3"/>
+              </a:buClr>
+              <a:buSzPts val="2800"/>
+              <a:buFont typeface="Frank Ruhl Libre Medium"/>
+              <a:buNone/>
+              <a:defRPr sz="2800" b="0" i="0" u="none" strike="noStrike" cap="none">
+                <a:solidFill>
+                  <a:schemeClr val="accent3"/>
+                </a:solidFill>
+                <a:latin typeface="Frank Ruhl Libre Medium"/>
+                <a:ea typeface="Frank Ruhl Libre Medium"/>
+                <a:cs typeface="Frank Ruhl Libre Medium"/>
+                <a:sym typeface="Frank Ruhl Libre Medium"/>
+              </a:defRPr>
+            </a:lvl5pPr>
+            <a:lvl6pPr marR="0" lvl="5" algn="l" rtl="0">
+              <a:lnSpc>
+                <a:spcPct val="100000"/>
+              </a:lnSpc>
+              <a:spcBef>
+                <a:spcPts val="0"/>
+              </a:spcBef>
+              <a:spcAft>
+                <a:spcPts val="0"/>
+              </a:spcAft>
+              <a:buClr>
+                <a:schemeClr val="accent3"/>
+              </a:buClr>
+              <a:buSzPts val="2800"/>
+              <a:buFont typeface="Frank Ruhl Libre Medium"/>
+              <a:buNone/>
+              <a:defRPr sz="2800" b="0" i="0" u="none" strike="noStrike" cap="none">
+                <a:solidFill>
+                  <a:schemeClr val="accent3"/>
+                </a:solidFill>
+                <a:latin typeface="Frank Ruhl Libre Medium"/>
+                <a:ea typeface="Frank Ruhl Libre Medium"/>
+                <a:cs typeface="Frank Ruhl Libre Medium"/>
+                <a:sym typeface="Frank Ruhl Libre Medium"/>
+              </a:defRPr>
+            </a:lvl6pPr>
+            <a:lvl7pPr marR="0" lvl="6" algn="l" rtl="0">
+              <a:lnSpc>
+                <a:spcPct val="100000"/>
+              </a:lnSpc>
+              <a:spcBef>
+                <a:spcPts val="0"/>
+              </a:spcBef>
+              <a:spcAft>
+                <a:spcPts val="0"/>
+              </a:spcAft>
+              <a:buClr>
+                <a:schemeClr val="accent3"/>
+              </a:buClr>
+              <a:buSzPts val="2800"/>
+              <a:buFont typeface="Frank Ruhl Libre Medium"/>
+              <a:buNone/>
+              <a:defRPr sz="2800" b="0" i="0" u="none" strike="noStrike" cap="none">
+                <a:solidFill>
+                  <a:schemeClr val="accent3"/>
+                </a:solidFill>
+                <a:latin typeface="Frank Ruhl Libre Medium"/>
+                <a:ea typeface="Frank Ruhl Libre Medium"/>
+                <a:cs typeface="Frank Ruhl Libre Medium"/>
+                <a:sym typeface="Frank Ruhl Libre Medium"/>
+              </a:defRPr>
+            </a:lvl7pPr>
+            <a:lvl8pPr marR="0" lvl="7" algn="l" rtl="0">
+              <a:lnSpc>
+                <a:spcPct val="100000"/>
+              </a:lnSpc>
+              <a:spcBef>
+                <a:spcPts val="0"/>
+              </a:spcBef>
+              <a:spcAft>
+                <a:spcPts val="0"/>
+              </a:spcAft>
+              <a:buClr>
+                <a:schemeClr val="accent3"/>
+              </a:buClr>
+              <a:buSzPts val="2800"/>
+              <a:buFont typeface="Frank Ruhl Libre Medium"/>
+              <a:buNone/>
+              <a:defRPr sz="2800" b="0" i="0" u="none" strike="noStrike" cap="none">
+                <a:solidFill>
+                  <a:schemeClr val="accent3"/>
+                </a:solidFill>
+                <a:latin typeface="Frank Ruhl Libre Medium"/>
+                <a:ea typeface="Frank Ruhl Libre Medium"/>
+                <a:cs typeface="Frank Ruhl Libre Medium"/>
+                <a:sym typeface="Frank Ruhl Libre Medium"/>
+              </a:defRPr>
+            </a:lvl8pPr>
+            <a:lvl9pPr marR="0" lvl="8" algn="l" rtl="0">
+              <a:lnSpc>
+                <a:spcPct val="100000"/>
+              </a:lnSpc>
+              <a:spcBef>
+                <a:spcPts val="0"/>
+              </a:spcBef>
+              <a:spcAft>
+                <a:spcPts val="0"/>
+              </a:spcAft>
+              <a:buClr>
+                <a:schemeClr val="accent3"/>
+              </a:buClr>
+              <a:buSzPts val="2800"/>
+              <a:buFont typeface="Frank Ruhl Libre Medium"/>
+              <a:buNone/>
+              <a:defRPr sz="2800" b="0" i="0" u="none" strike="noStrike" cap="none">
+                <a:solidFill>
+                  <a:schemeClr val="accent3"/>
+                </a:solidFill>
+                <a:latin typeface="Frank Ruhl Libre Medium"/>
+                <a:ea typeface="Frank Ruhl Libre Medium"/>
+                <a:cs typeface="Frank Ruhl Libre Medium"/>
+                <a:sym typeface="Frank Ruhl Libre Medium"/>
+              </a:defRPr>
+            </a:lvl9pPr>
+          </a:lstStyle>
+          <a:p>
+            <a:r>
+              <a:rPr lang="en-US" sz="8000" b="1" dirty="0">
+                <a:solidFill>
+                  <a:schemeClr val="bg1"/>
+                </a:solidFill>
+                <a:latin typeface="Bahnschrift SemiLight Condensed" panose="020B0502040204020203" pitchFamily="34" charset="0"/>
+              </a:rPr>
+              <a:t>Bargain Team</a:t>
+            </a:r>
+            <a:endParaRPr lang="bg-BG" sz="8000" b="1" dirty="0">
+              <a:solidFill>
+                <a:schemeClr val="bg1"/>
+              </a:solidFill>
+              <a:latin typeface="Bahnschrift SemiLight Condensed" panose="020B0502040204020203" pitchFamily="34" charset="0"/>
+            </a:endParaRPr>
+          </a:p>
+        </p:txBody>
+      </p:sp>
     </p:spTree>
   </p:cSld>
   <p:clrMapOvr>
@@ -9209,10 +9465,18 @@
               <a:buNone/>
             </a:pPr>
             <a:r>
-              <a:rPr lang="en" dirty="0"/>
+              <a:rPr lang="en" dirty="0">
+                <a:solidFill>
+                  <a:srgbClr val="FF0000"/>
+                </a:solidFill>
+              </a:rPr>
               <a:t>Programs we used</a:t>
             </a:r>
-            <a:endParaRPr dirty="0"/>
+            <a:endParaRPr dirty="0">
+              <a:solidFill>
+                <a:srgbClr val="FF0000"/>
+              </a:solidFill>
+            </a:endParaRPr>
           </a:p>
         </p:txBody>
       </p:sp>
@@ -9251,10 +9515,18 @@
               <a:buNone/>
             </a:pPr>
             <a:r>
-              <a:rPr lang="en" dirty="0"/>
+              <a:rPr lang="en" dirty="0">
+                <a:solidFill>
+                  <a:schemeClr val="bg1"/>
+                </a:solidFill>
+              </a:rPr>
               <a:t>Our team</a:t>
             </a:r>
-            <a:endParaRPr dirty="0"/>
+            <a:endParaRPr dirty="0">
+              <a:solidFill>
+                <a:schemeClr val="bg1"/>
+              </a:solidFill>
+            </a:endParaRPr>
           </a:p>
         </p:txBody>
       </p:sp>
@@ -9293,52 +9565,18 @@
               <a:buNone/>
             </a:pPr>
             <a:r>
-              <a:rPr lang="en" dirty="0"/>
+              <a:rPr lang="en" dirty="0">
+                <a:solidFill>
+                  <a:schemeClr val="bg1"/>
+                </a:solidFill>
+              </a:rPr>
               <a:t>Our idea</a:t>
             </a:r>
-            <a:endParaRPr dirty="0"/>
-          </a:p>
-        </p:txBody>
-      </p:sp>
-      <p:sp>
-        <p:nvSpPr>
-          <p:cNvPr id="191" name="Google Shape;191;p30"/>
-          <p:cNvSpPr txBox="1">
-            <a:spLocks noGrp="1"/>
-          </p:cNvSpPr>
-          <p:nvPr>
-            <p:ph type="title" idx="6"/>
-          </p:nvPr>
-        </p:nvSpPr>
-        <p:spPr>
-          <a:xfrm>
-            <a:off x="3296969" y="373938"/>
-            <a:ext cx="2550061" cy="724582"/>
-          </a:xfrm>
-          <a:prstGeom prst="rect">
-            <a:avLst/>
-          </a:prstGeom>
-        </p:spPr>
-        <p:txBody>
-          <a:bodyPr spcFirstLastPara="1" wrap="square" lIns="91425" tIns="91425" rIns="91425" bIns="91425" anchor="t" anchorCtr="0">
-            <a:noAutofit/>
-          </a:bodyPr>
-          <a:lstStyle/>
-          <a:p>
-            <a:pPr marL="0" lvl="0" indent="0" algn="l" rtl="0">
-              <a:spcBef>
-                <a:spcPts val="0"/>
-              </a:spcBef>
-              <a:spcAft>
-                <a:spcPts val="0"/>
-              </a:spcAft>
-              <a:buNone/>
-            </a:pPr>
-            <a:r>
-              <a:rPr lang="en" dirty="0"/>
-              <a:t>Table of contents</a:t>
-            </a:r>
-            <a:endParaRPr dirty="0"/>
+            <a:endParaRPr dirty="0">
+              <a:solidFill>
+                <a:schemeClr val="bg1"/>
+              </a:solidFill>
+            </a:endParaRPr>
           </a:p>
         </p:txBody>
       </p:sp>
@@ -9377,10 +9615,18 @@
               <a:buNone/>
             </a:pPr>
             <a:r>
-              <a:rPr lang="en-US" dirty="0"/>
+              <a:rPr lang="en-US" dirty="0">
+                <a:solidFill>
+                  <a:srgbClr val="FF0000"/>
+                </a:solidFill>
+              </a:rPr>
               <a:t>Stages of realization</a:t>
             </a:r>
-            <a:endParaRPr dirty="0"/>
+            <a:endParaRPr dirty="0">
+              <a:solidFill>
+                <a:srgbClr val="FF0000"/>
+              </a:solidFill>
+            </a:endParaRPr>
           </a:p>
         </p:txBody>
       </p:sp>
@@ -9419,10 +9665,18 @@
               <a:buNone/>
             </a:pPr>
             <a:r>
-              <a:rPr lang="en" dirty="0"/>
+              <a:rPr lang="en" dirty="0">
+                <a:solidFill>
+                  <a:srgbClr val="FF0000"/>
+                </a:solidFill>
+              </a:rPr>
               <a:t>01</a:t>
             </a:r>
-            <a:endParaRPr dirty="0"/>
+            <a:endParaRPr dirty="0">
+              <a:solidFill>
+                <a:srgbClr val="FF0000"/>
+              </a:solidFill>
+            </a:endParaRPr>
           </a:p>
         </p:txBody>
       </p:sp>
@@ -9503,10 +9757,18 @@
               <a:buNone/>
             </a:pPr>
             <a:r>
-              <a:rPr lang="en"/>
+              <a:rPr lang="en" dirty="0">
+                <a:solidFill>
+                  <a:srgbClr val="FF0000"/>
+                </a:solidFill>
+              </a:rPr>
               <a:t>02</a:t>
             </a:r>
-            <a:endParaRPr/>
+            <a:endParaRPr dirty="0">
+              <a:solidFill>
+                <a:srgbClr val="FF0000"/>
+              </a:solidFill>
+            </a:endParaRPr>
           </a:p>
         </p:txBody>
       </p:sp>
@@ -9656,6 +9918,303 @@
           </a:ln>
         </p:spPr>
       </p:cxnSp>
+      <p:sp>
+        <p:nvSpPr>
+          <p:cNvPr id="17" name="Title 1">
+            <a:extLst>
+              <a:ext uri="{FF2B5EF4-FFF2-40B4-BE49-F238E27FC236}">
+                <a16:creationId xmlns:a16="http://schemas.microsoft.com/office/drawing/2014/main" id="{56CE9165-5AB0-4E29-B21E-121A83349D82}"/>
+              </a:ext>
+            </a:extLst>
+          </p:cNvPr>
+          <p:cNvSpPr txBox="1">
+            <a:spLocks/>
+          </p:cNvSpPr>
+          <p:nvPr/>
+        </p:nvSpPr>
+        <p:spPr>
+          <a:xfrm>
+            <a:off x="2157780" y="-116136"/>
+            <a:ext cx="8175812" cy="1742905"/>
+          </a:xfrm>
+          <a:prstGeom prst="rect">
+            <a:avLst/>
+          </a:prstGeom>
+          <a:noFill/>
+          <a:ln>
+            <a:noFill/>
+          </a:ln>
+        </p:spPr>
+        <p:txBody>
+          <a:bodyPr spcFirstLastPara="1" wrap="square" lIns="91425" tIns="91425" rIns="91425" bIns="91425" anchor="t" anchorCtr="0">
+            <a:noAutofit/>
+          </a:bodyPr>
+          <a:lstStyle>
+            <a:defPPr marR="0" lvl="0" algn="l" rtl="0">
+              <a:lnSpc>
+                <a:spcPct val="100000"/>
+              </a:lnSpc>
+              <a:spcBef>
+                <a:spcPts val="0"/>
+              </a:spcBef>
+              <a:spcAft>
+                <a:spcPts val="0"/>
+              </a:spcAft>
+            </a:defPPr>
+            <a:lvl1pPr marR="0" lvl="0" algn="l" rtl="0">
+              <a:lnSpc>
+                <a:spcPct val="100000"/>
+              </a:lnSpc>
+              <a:spcBef>
+                <a:spcPts val="0"/>
+              </a:spcBef>
+              <a:spcAft>
+                <a:spcPts val="0"/>
+              </a:spcAft>
+              <a:buClr>
+                <a:schemeClr val="accent3"/>
+              </a:buClr>
+              <a:buSzPts val="2800"/>
+              <a:buFont typeface="Oswald Medium"/>
+              <a:buNone/>
+              <a:defRPr sz="2800" b="0" i="0" u="none" strike="noStrike" cap="none">
+                <a:solidFill>
+                  <a:schemeClr val="accent3"/>
+                </a:solidFill>
+                <a:latin typeface="Oswald Medium"/>
+                <a:ea typeface="Oswald Medium"/>
+                <a:cs typeface="Oswald Medium"/>
+                <a:sym typeface="Oswald Medium"/>
+              </a:defRPr>
+            </a:lvl1pPr>
+            <a:lvl2pPr marR="0" lvl="1" algn="l" rtl="0">
+              <a:lnSpc>
+                <a:spcPct val="100000"/>
+              </a:lnSpc>
+              <a:spcBef>
+                <a:spcPts val="0"/>
+              </a:spcBef>
+              <a:spcAft>
+                <a:spcPts val="0"/>
+              </a:spcAft>
+              <a:buClr>
+                <a:schemeClr val="accent3"/>
+              </a:buClr>
+              <a:buSzPts val="2800"/>
+              <a:buFont typeface="Frank Ruhl Libre Medium"/>
+              <a:buNone/>
+              <a:defRPr sz="2800" b="0" i="0" u="none" strike="noStrike" cap="none">
+                <a:solidFill>
+                  <a:schemeClr val="accent3"/>
+                </a:solidFill>
+                <a:latin typeface="Frank Ruhl Libre Medium"/>
+                <a:ea typeface="Frank Ruhl Libre Medium"/>
+                <a:cs typeface="Frank Ruhl Libre Medium"/>
+                <a:sym typeface="Frank Ruhl Libre Medium"/>
+              </a:defRPr>
+            </a:lvl2pPr>
+            <a:lvl3pPr marR="0" lvl="2" algn="l" rtl="0">
+              <a:lnSpc>
+                <a:spcPct val="100000"/>
+              </a:lnSpc>
+              <a:spcBef>
+                <a:spcPts val="0"/>
+              </a:spcBef>
+              <a:spcAft>
+                <a:spcPts val="0"/>
+              </a:spcAft>
+              <a:buClr>
+                <a:schemeClr val="accent3"/>
+              </a:buClr>
+              <a:buSzPts val="2800"/>
+              <a:buFont typeface="Frank Ruhl Libre Medium"/>
+              <a:buNone/>
+              <a:defRPr sz="2800" b="0" i="0" u="none" strike="noStrike" cap="none">
+                <a:solidFill>
+                  <a:schemeClr val="accent3"/>
+                </a:solidFill>
+                <a:latin typeface="Frank Ruhl Libre Medium"/>
+                <a:ea typeface="Frank Ruhl Libre Medium"/>
+                <a:cs typeface="Frank Ruhl Libre Medium"/>
+                <a:sym typeface="Frank Ruhl Libre Medium"/>
+              </a:defRPr>
+            </a:lvl3pPr>
+            <a:lvl4pPr marR="0" lvl="3" algn="l" rtl="0">
+              <a:lnSpc>
+                <a:spcPct val="100000"/>
+              </a:lnSpc>
+              <a:spcBef>
+                <a:spcPts val="0"/>
+              </a:spcBef>
+              <a:spcAft>
+                <a:spcPts val="0"/>
+              </a:spcAft>
+              <a:buClr>
+                <a:schemeClr val="accent3"/>
+              </a:buClr>
+              <a:buSzPts val="2800"/>
+              <a:buFont typeface="Frank Ruhl Libre Medium"/>
+              <a:buNone/>
+              <a:defRPr sz="2800" b="0" i="0" u="none" strike="noStrike" cap="none">
+                <a:solidFill>
+                  <a:schemeClr val="accent3"/>
+                </a:solidFill>
+                <a:latin typeface="Frank Ruhl Libre Medium"/>
+                <a:ea typeface="Frank Ruhl Libre Medium"/>
+                <a:cs typeface="Frank Ruhl Libre Medium"/>
+                <a:sym typeface="Frank Ruhl Libre Medium"/>
+              </a:defRPr>
+            </a:lvl4pPr>
+            <a:lvl5pPr marR="0" lvl="4" algn="l" rtl="0">
+              <a:lnSpc>
+                <a:spcPct val="100000"/>
+              </a:lnSpc>
+              <a:spcBef>
+                <a:spcPts val="0"/>
+              </a:spcBef>
+              <a:spcAft>
+                <a:spcPts val="0"/>
+              </a:spcAft>
+              <a:buClr>
+                <a:schemeClr val="accent3"/>
+              </a:buClr>
+              <a:buSzPts val="2800"/>
+              <a:buFont typeface="Frank Ruhl Libre Medium"/>
+              <a:buNone/>
+              <a:defRPr sz="2800" b="0" i="0" u="none" strike="noStrike" cap="none">
+                <a:solidFill>
+                  <a:schemeClr val="accent3"/>
+                </a:solidFill>
+                <a:latin typeface="Frank Ruhl Libre Medium"/>
+                <a:ea typeface="Frank Ruhl Libre Medium"/>
+                <a:cs typeface="Frank Ruhl Libre Medium"/>
+                <a:sym typeface="Frank Ruhl Libre Medium"/>
+              </a:defRPr>
+            </a:lvl5pPr>
+            <a:lvl6pPr marR="0" lvl="5" algn="l" rtl="0">
+              <a:lnSpc>
+                <a:spcPct val="100000"/>
+              </a:lnSpc>
+              <a:spcBef>
+                <a:spcPts val="0"/>
+              </a:spcBef>
+              <a:spcAft>
+                <a:spcPts val="0"/>
+              </a:spcAft>
+              <a:buClr>
+                <a:schemeClr val="accent3"/>
+              </a:buClr>
+              <a:buSzPts val="2800"/>
+              <a:buFont typeface="Frank Ruhl Libre Medium"/>
+              <a:buNone/>
+              <a:defRPr sz="2800" b="0" i="0" u="none" strike="noStrike" cap="none">
+                <a:solidFill>
+                  <a:schemeClr val="accent3"/>
+                </a:solidFill>
+                <a:latin typeface="Frank Ruhl Libre Medium"/>
+                <a:ea typeface="Frank Ruhl Libre Medium"/>
+                <a:cs typeface="Frank Ruhl Libre Medium"/>
+                <a:sym typeface="Frank Ruhl Libre Medium"/>
+              </a:defRPr>
+            </a:lvl6pPr>
+            <a:lvl7pPr marR="0" lvl="6" algn="l" rtl="0">
+              <a:lnSpc>
+                <a:spcPct val="100000"/>
+              </a:lnSpc>
+              <a:spcBef>
+                <a:spcPts val="0"/>
+              </a:spcBef>
+              <a:spcAft>
+                <a:spcPts val="0"/>
+              </a:spcAft>
+              <a:buClr>
+                <a:schemeClr val="accent3"/>
+              </a:buClr>
+              <a:buSzPts val="2800"/>
+              <a:buFont typeface="Frank Ruhl Libre Medium"/>
+              <a:buNone/>
+              <a:defRPr sz="2800" b="0" i="0" u="none" strike="noStrike" cap="none">
+                <a:solidFill>
+                  <a:schemeClr val="accent3"/>
+                </a:solidFill>
+                <a:latin typeface="Frank Ruhl Libre Medium"/>
+                <a:ea typeface="Frank Ruhl Libre Medium"/>
+                <a:cs typeface="Frank Ruhl Libre Medium"/>
+                <a:sym typeface="Frank Ruhl Libre Medium"/>
+              </a:defRPr>
+            </a:lvl7pPr>
+            <a:lvl8pPr marR="0" lvl="7" algn="l" rtl="0">
+              <a:lnSpc>
+                <a:spcPct val="100000"/>
+              </a:lnSpc>
+              <a:spcBef>
+                <a:spcPts val="0"/>
+              </a:spcBef>
+              <a:spcAft>
+                <a:spcPts val="0"/>
+              </a:spcAft>
+              <a:buClr>
+                <a:schemeClr val="accent3"/>
+              </a:buClr>
+              <a:buSzPts val="2800"/>
+              <a:buFont typeface="Frank Ruhl Libre Medium"/>
+              <a:buNone/>
+              <a:defRPr sz="2800" b="0" i="0" u="none" strike="noStrike" cap="none">
+                <a:solidFill>
+                  <a:schemeClr val="accent3"/>
+                </a:solidFill>
+                <a:latin typeface="Frank Ruhl Libre Medium"/>
+                <a:ea typeface="Frank Ruhl Libre Medium"/>
+                <a:cs typeface="Frank Ruhl Libre Medium"/>
+                <a:sym typeface="Frank Ruhl Libre Medium"/>
+              </a:defRPr>
+            </a:lvl8pPr>
+            <a:lvl9pPr marR="0" lvl="8" algn="l" rtl="0">
+              <a:lnSpc>
+                <a:spcPct val="100000"/>
+              </a:lnSpc>
+              <a:spcBef>
+                <a:spcPts val="0"/>
+              </a:spcBef>
+              <a:spcAft>
+                <a:spcPts val="0"/>
+              </a:spcAft>
+              <a:buClr>
+                <a:schemeClr val="accent3"/>
+              </a:buClr>
+              <a:buSzPts val="2800"/>
+              <a:buFont typeface="Frank Ruhl Libre Medium"/>
+              <a:buNone/>
+              <a:defRPr sz="2800" b="0" i="0" u="none" strike="noStrike" cap="none">
+                <a:solidFill>
+                  <a:schemeClr val="accent3"/>
+                </a:solidFill>
+                <a:latin typeface="Frank Ruhl Libre Medium"/>
+                <a:ea typeface="Frank Ruhl Libre Medium"/>
+                <a:cs typeface="Frank Ruhl Libre Medium"/>
+                <a:sym typeface="Frank Ruhl Libre Medium"/>
+              </a:defRPr>
+            </a:lvl9pPr>
+          </a:lstStyle>
+          <a:p>
+            <a:r>
+              <a:rPr lang="en-US" sz="6600" b="1" dirty="0">
+                <a:solidFill>
+                  <a:schemeClr val="bg1"/>
+                </a:solidFill>
+                <a:latin typeface="Bahnschrift SemiLight Condensed" panose="020B0502040204020203" pitchFamily="34" charset="0"/>
+              </a:rPr>
+              <a:t>Table of contents</a:t>
+            </a:r>
+            <a:endParaRPr lang="bg-BG" sz="6600" b="1" dirty="0">
+              <a:solidFill>
+                <a:schemeClr val="bg1"/>
+              </a:solidFill>
+              <a:latin typeface="Bahnschrift SemiLight Condensed" panose="020B0502040204020203" pitchFamily="34" charset="0"/>
+            </a:endParaRPr>
+          </a:p>
+        </p:txBody>
+      </p:sp>
     </p:spTree>
   </p:cSld>
   <p:clrMapOvr>
@@ -10008,13 +10567,36 @@
         </p:blipFill>
         <p:spPr bwMode="auto">
           <a:xfrm>
-            <a:off x="605988" y="1566892"/>
-            <a:ext cx="929327" cy="982284"/>
+            <a:off x="344960" y="1331897"/>
+            <a:ext cx="1348416" cy="1425254"/>
           </a:xfrm>
-          <a:prstGeom prst="rect">
+          <a:prstGeom prst="ellipse">
             <a:avLst/>
           </a:prstGeom>
-          <a:noFill/>
+          <a:ln w="12700" cap="rnd">
+            <a:solidFill>
+              <a:schemeClr val="bg1"/>
+            </a:solidFill>
+          </a:ln>
+          <a:effectLst>
+            <a:outerShdw blurRad="381000" dist="292100" dir="5400000" sx="-80000" sy="-18000" rotWithShape="0">
+              <a:srgbClr val="000000">
+                <a:alpha val="22000"/>
+              </a:srgbClr>
+            </a:outerShdw>
+          </a:effectLst>
+          <a:scene3d>
+            <a:camera prst="orthographicFront"/>
+            <a:lightRig rig="contrasting" dir="t">
+              <a:rot lat="0" lon="0" rev="3000000"/>
+            </a:lightRig>
+          </a:scene3d>
+          <a:sp3d contourW="7620">
+            <a:bevelT w="95250" h="31750"/>
+            <a:contourClr>
+              <a:srgbClr val="333333"/>
+            </a:contourClr>
+          </a:sp3d>
           <a:extLst>
             <a:ext uri="{909E8E84-426E-40DD-AFC4-6F175D3DCCD1}">
               <a14:hiddenFill xmlns:a14="http://schemas.microsoft.com/office/drawing/2010/main">
@@ -10053,13 +10635,36 @@
         </p:blipFill>
         <p:spPr bwMode="auto">
           <a:xfrm>
-            <a:off x="2938119" y="1589466"/>
-            <a:ext cx="932480" cy="982284"/>
+            <a:off x="2695570" y="1370390"/>
+            <a:ext cx="1348416" cy="1420436"/>
           </a:xfrm>
-          <a:prstGeom prst="rect">
+          <a:prstGeom prst="ellipse">
             <a:avLst/>
           </a:prstGeom>
-          <a:noFill/>
+          <a:ln w="12700" cap="rnd">
+            <a:solidFill>
+              <a:schemeClr val="bg1"/>
+            </a:solidFill>
+          </a:ln>
+          <a:effectLst>
+            <a:outerShdw blurRad="381000" dist="292100" dir="5400000" sx="-80000" sy="-18000" rotWithShape="0">
+              <a:srgbClr val="000000">
+                <a:alpha val="22000"/>
+              </a:srgbClr>
+            </a:outerShdw>
+          </a:effectLst>
+          <a:scene3d>
+            <a:camera prst="orthographicFront"/>
+            <a:lightRig rig="contrasting" dir="t">
+              <a:rot lat="0" lon="0" rev="3000000"/>
+            </a:lightRig>
+          </a:scene3d>
+          <a:sp3d contourW="7620">
+            <a:bevelT w="95250" h="31750"/>
+            <a:contourClr>
+              <a:srgbClr val="333333"/>
+            </a:contourClr>
+          </a:sp3d>
           <a:extLst>
             <a:ext uri="{909E8E84-426E-40DD-AFC4-6F175D3DCCD1}">
               <a14:hiddenFill xmlns:a14="http://schemas.microsoft.com/office/drawing/2010/main">
@@ -10100,13 +10705,36 @@
         </p:blipFill>
         <p:spPr bwMode="auto">
           <a:xfrm>
-            <a:off x="5273403" y="1589466"/>
-            <a:ext cx="932480" cy="982284"/>
+            <a:off x="5115342" y="1370391"/>
+            <a:ext cx="1348416" cy="1420435"/>
           </a:xfrm>
-          <a:prstGeom prst="rect">
+          <a:prstGeom prst="ellipse">
             <a:avLst/>
           </a:prstGeom>
-          <a:noFill/>
+          <a:ln w="12700" cap="rnd">
+            <a:solidFill>
+              <a:schemeClr val="bg1"/>
+            </a:solidFill>
+          </a:ln>
+          <a:effectLst>
+            <a:outerShdw blurRad="381000" dist="292100" dir="5400000" sx="-80000" sy="-18000" rotWithShape="0">
+              <a:srgbClr val="000000">
+                <a:alpha val="22000"/>
+              </a:srgbClr>
+            </a:outerShdw>
+          </a:effectLst>
+          <a:scene3d>
+            <a:camera prst="orthographicFront"/>
+            <a:lightRig rig="contrasting" dir="t">
+              <a:rot lat="0" lon="0" rev="3000000"/>
+            </a:lightRig>
+          </a:scene3d>
+          <a:sp3d contourW="7620">
+            <a:bevelT w="95250" h="31750"/>
+            <a:contourClr>
+              <a:srgbClr val="333333"/>
+            </a:contourClr>
+          </a:sp3d>
           <a:extLst>
             <a:ext uri="{909E8E84-426E-40DD-AFC4-6F175D3DCCD1}">
               <a14:hiddenFill xmlns:a14="http://schemas.microsoft.com/office/drawing/2010/main">
@@ -10146,12 +10774,36 @@
         </p:blipFill>
         <p:spPr>
           <a:xfrm>
-            <a:off x="7421221" y="1578663"/>
-            <a:ext cx="932480" cy="982284"/>
+            <a:off x="7196823" y="1315123"/>
+            <a:ext cx="1348417" cy="1420436"/>
           </a:xfrm>
-          <a:prstGeom prst="rect">
+          <a:prstGeom prst="ellipse">
             <a:avLst/>
           </a:prstGeom>
+          <a:ln w="9525" cap="rnd">
+            <a:solidFill>
+              <a:schemeClr val="bg1"/>
+            </a:solidFill>
+          </a:ln>
+          <a:effectLst>
+            <a:outerShdw blurRad="381000" dist="292100" dir="5400000" sx="-80000" sy="-18000" rotWithShape="0">
+              <a:srgbClr val="000000">
+                <a:alpha val="22000"/>
+              </a:srgbClr>
+            </a:outerShdw>
+          </a:effectLst>
+          <a:scene3d>
+            <a:camera prst="orthographicFront"/>
+            <a:lightRig rig="contrasting" dir="t">
+              <a:rot lat="0" lon="0" rev="3000000"/>
+            </a:lightRig>
+          </a:scene3d>
+          <a:sp3d contourW="7620">
+            <a:bevelT w="95250" h="31750"/>
+            <a:contourClr>
+              <a:srgbClr val="333333"/>
+            </a:contourClr>
+          </a:sp3d>
         </p:spPr>
       </p:pic>
       <p:cxnSp>
@@ -11379,135 +12031,329 @@
       </p:grpSpPr>
       <p:sp>
         <p:nvSpPr>
-          <p:cNvPr id="223" name="Google Shape;223;p32"/>
+          <p:cNvPr id="7" name="Title 1">
+            <a:extLst>
+              <a:ext uri="{FF2B5EF4-FFF2-40B4-BE49-F238E27FC236}">
+                <a16:creationId xmlns:a16="http://schemas.microsoft.com/office/drawing/2014/main" id="{8B705ACC-ABC8-4D72-BA19-810C681BDA12}"/>
+              </a:ext>
+            </a:extLst>
+          </p:cNvPr>
           <p:cNvSpPr txBox="1">
-            <a:spLocks noGrp="1"/>
+            <a:spLocks/>
           </p:cNvSpPr>
-          <p:nvPr>
-            <p:ph type="title"/>
-          </p:nvPr>
+          <p:nvPr/>
         </p:nvSpPr>
         <p:spPr>
           <a:xfrm>
-            <a:off x="2924250" y="774207"/>
-            <a:ext cx="3295500" cy="1076023"/>
+            <a:off x="2679326" y="-147882"/>
+            <a:ext cx="3785348" cy="1742905"/>
           </a:xfrm>
           <a:prstGeom prst="rect">
             <a:avLst/>
           </a:prstGeom>
+          <a:noFill/>
+          <a:ln>
+            <a:noFill/>
+          </a:ln>
         </p:spPr>
         <p:txBody>
           <a:bodyPr spcFirstLastPara="1" wrap="square" lIns="91425" tIns="91425" rIns="91425" bIns="91425" anchor="ctr" anchorCtr="0">
             <a:noAutofit/>
           </a:bodyPr>
-          <a:lstStyle/>
-          <a:p>
-            <a:pPr marL="0" lvl="0" indent="0" algn="ctr" rtl="0">
-              <a:spcBef>
-                <a:spcPts val="0"/>
-              </a:spcBef>
-              <a:spcAft>
-                <a:spcPts val="0"/>
-              </a:spcAft>
-              <a:buNone/>
-            </a:pPr>
-            <a:r>
-              <a:rPr lang="en-US" dirty="0">
-                <a:solidFill>
-                  <a:schemeClr val="accent3"/>
+          <a:lstStyle>
+            <a:defPPr marR="0" lvl="0" algn="l" rtl="0">
+              <a:lnSpc>
+                <a:spcPct val="100000"/>
+              </a:lnSpc>
+              <a:spcBef>
+                <a:spcPts val="0"/>
+              </a:spcBef>
+              <a:spcAft>
+                <a:spcPts val="0"/>
+              </a:spcAft>
+            </a:defPPr>
+            <a:lvl1pPr marR="0" lvl="0" algn="l" rtl="0">
+              <a:lnSpc>
+                <a:spcPct val="100000"/>
+              </a:lnSpc>
+              <a:spcBef>
+                <a:spcPts val="0"/>
+              </a:spcBef>
+              <a:spcAft>
+                <a:spcPts val="0"/>
+              </a:spcAft>
+              <a:buClr>
+                <a:srgbClr val="FFFFFF"/>
+              </a:buClr>
+              <a:buSzPts val="3600"/>
+              <a:buFont typeface="Oswald Medium"/>
+              <a:buNone/>
+              <a:defRPr sz="3900" b="0" i="0" u="none" strike="noStrike" cap="none">
+                <a:solidFill>
+                  <a:schemeClr val="lt2"/>
                 </a:solidFill>
                 <a:latin typeface="Oswald Medium"/>
                 <a:ea typeface="Oswald Medium"/>
                 <a:cs typeface="Oswald Medium"/>
                 <a:sym typeface="Oswald Medium"/>
+              </a:defRPr>
+            </a:lvl1pPr>
+            <a:lvl2pPr marR="0" lvl="1" algn="ctr" rtl="0">
+              <a:lnSpc>
+                <a:spcPct val="100000"/>
+              </a:lnSpc>
+              <a:spcBef>
+                <a:spcPts val="0"/>
+              </a:spcBef>
+              <a:spcAft>
+                <a:spcPts val="0"/>
+              </a:spcAft>
+              <a:buClr>
+                <a:srgbClr val="FFFFFF"/>
+              </a:buClr>
+              <a:buSzPts val="3600"/>
+              <a:buFont typeface="Frank Ruhl Libre Medium"/>
+              <a:buNone/>
+              <a:defRPr sz="3600" b="0" i="0" u="none" strike="noStrike" cap="none">
+                <a:solidFill>
+                  <a:srgbClr val="FFFFFF"/>
+                </a:solidFill>
+                <a:latin typeface="Frank Ruhl Libre Medium"/>
+                <a:ea typeface="Frank Ruhl Libre Medium"/>
+                <a:cs typeface="Frank Ruhl Libre Medium"/>
+                <a:sym typeface="Frank Ruhl Libre Medium"/>
+              </a:defRPr>
+            </a:lvl2pPr>
+            <a:lvl3pPr marR="0" lvl="2" algn="ctr" rtl="0">
+              <a:lnSpc>
+                <a:spcPct val="100000"/>
+              </a:lnSpc>
+              <a:spcBef>
+                <a:spcPts val="0"/>
+              </a:spcBef>
+              <a:spcAft>
+                <a:spcPts val="0"/>
+              </a:spcAft>
+              <a:buClr>
+                <a:srgbClr val="FFFFFF"/>
+              </a:buClr>
+              <a:buSzPts val="3600"/>
+              <a:buFont typeface="Frank Ruhl Libre Medium"/>
+              <a:buNone/>
+              <a:defRPr sz="3600" b="0" i="0" u="none" strike="noStrike" cap="none">
+                <a:solidFill>
+                  <a:srgbClr val="FFFFFF"/>
+                </a:solidFill>
+                <a:latin typeface="Frank Ruhl Libre Medium"/>
+                <a:ea typeface="Frank Ruhl Libre Medium"/>
+                <a:cs typeface="Frank Ruhl Libre Medium"/>
+                <a:sym typeface="Frank Ruhl Libre Medium"/>
+              </a:defRPr>
+            </a:lvl3pPr>
+            <a:lvl4pPr marR="0" lvl="3" algn="ctr" rtl="0">
+              <a:lnSpc>
+                <a:spcPct val="100000"/>
+              </a:lnSpc>
+              <a:spcBef>
+                <a:spcPts val="0"/>
+              </a:spcBef>
+              <a:spcAft>
+                <a:spcPts val="0"/>
+              </a:spcAft>
+              <a:buClr>
+                <a:srgbClr val="FFFFFF"/>
+              </a:buClr>
+              <a:buSzPts val="3600"/>
+              <a:buFont typeface="Frank Ruhl Libre Medium"/>
+              <a:buNone/>
+              <a:defRPr sz="3600" b="0" i="0" u="none" strike="noStrike" cap="none">
+                <a:solidFill>
+                  <a:srgbClr val="FFFFFF"/>
+                </a:solidFill>
+                <a:latin typeface="Frank Ruhl Libre Medium"/>
+                <a:ea typeface="Frank Ruhl Libre Medium"/>
+                <a:cs typeface="Frank Ruhl Libre Medium"/>
+                <a:sym typeface="Frank Ruhl Libre Medium"/>
+              </a:defRPr>
+            </a:lvl4pPr>
+            <a:lvl5pPr marR="0" lvl="4" algn="ctr" rtl="0">
+              <a:lnSpc>
+                <a:spcPct val="100000"/>
+              </a:lnSpc>
+              <a:spcBef>
+                <a:spcPts val="0"/>
+              </a:spcBef>
+              <a:spcAft>
+                <a:spcPts val="0"/>
+              </a:spcAft>
+              <a:buClr>
+                <a:srgbClr val="FFFFFF"/>
+              </a:buClr>
+              <a:buSzPts val="3600"/>
+              <a:buFont typeface="Frank Ruhl Libre Medium"/>
+              <a:buNone/>
+              <a:defRPr sz="3600" b="0" i="0" u="none" strike="noStrike" cap="none">
+                <a:solidFill>
+                  <a:srgbClr val="FFFFFF"/>
+                </a:solidFill>
+                <a:latin typeface="Frank Ruhl Libre Medium"/>
+                <a:ea typeface="Frank Ruhl Libre Medium"/>
+                <a:cs typeface="Frank Ruhl Libre Medium"/>
+                <a:sym typeface="Frank Ruhl Libre Medium"/>
+              </a:defRPr>
+            </a:lvl5pPr>
+            <a:lvl6pPr marR="0" lvl="5" algn="ctr" rtl="0">
+              <a:lnSpc>
+                <a:spcPct val="100000"/>
+              </a:lnSpc>
+              <a:spcBef>
+                <a:spcPts val="0"/>
+              </a:spcBef>
+              <a:spcAft>
+                <a:spcPts val="0"/>
+              </a:spcAft>
+              <a:buClr>
+                <a:srgbClr val="FFFFFF"/>
+              </a:buClr>
+              <a:buSzPts val="3600"/>
+              <a:buFont typeface="Frank Ruhl Libre Medium"/>
+              <a:buNone/>
+              <a:defRPr sz="3600" b="0" i="0" u="none" strike="noStrike" cap="none">
+                <a:solidFill>
+                  <a:srgbClr val="FFFFFF"/>
+                </a:solidFill>
+                <a:latin typeface="Frank Ruhl Libre Medium"/>
+                <a:ea typeface="Frank Ruhl Libre Medium"/>
+                <a:cs typeface="Frank Ruhl Libre Medium"/>
+                <a:sym typeface="Frank Ruhl Libre Medium"/>
+              </a:defRPr>
+            </a:lvl6pPr>
+            <a:lvl7pPr marR="0" lvl="6" algn="ctr" rtl="0">
+              <a:lnSpc>
+                <a:spcPct val="100000"/>
+              </a:lnSpc>
+              <a:spcBef>
+                <a:spcPts val="0"/>
+              </a:spcBef>
+              <a:spcAft>
+                <a:spcPts val="0"/>
+              </a:spcAft>
+              <a:buClr>
+                <a:srgbClr val="FFFFFF"/>
+              </a:buClr>
+              <a:buSzPts val="3600"/>
+              <a:buFont typeface="Frank Ruhl Libre Medium"/>
+              <a:buNone/>
+              <a:defRPr sz="3600" b="0" i="0" u="none" strike="noStrike" cap="none">
+                <a:solidFill>
+                  <a:srgbClr val="FFFFFF"/>
+                </a:solidFill>
+                <a:latin typeface="Frank Ruhl Libre Medium"/>
+                <a:ea typeface="Frank Ruhl Libre Medium"/>
+                <a:cs typeface="Frank Ruhl Libre Medium"/>
+                <a:sym typeface="Frank Ruhl Libre Medium"/>
+              </a:defRPr>
+            </a:lvl7pPr>
+            <a:lvl8pPr marR="0" lvl="7" algn="ctr" rtl="0">
+              <a:lnSpc>
+                <a:spcPct val="100000"/>
+              </a:lnSpc>
+              <a:spcBef>
+                <a:spcPts val="0"/>
+              </a:spcBef>
+              <a:spcAft>
+                <a:spcPts val="0"/>
+              </a:spcAft>
+              <a:buClr>
+                <a:srgbClr val="FFFFFF"/>
+              </a:buClr>
+              <a:buSzPts val="3600"/>
+              <a:buFont typeface="Frank Ruhl Libre Medium"/>
+              <a:buNone/>
+              <a:defRPr sz="3600" b="0" i="0" u="none" strike="noStrike" cap="none">
+                <a:solidFill>
+                  <a:srgbClr val="FFFFFF"/>
+                </a:solidFill>
+                <a:latin typeface="Frank Ruhl Libre Medium"/>
+                <a:ea typeface="Frank Ruhl Libre Medium"/>
+                <a:cs typeface="Frank Ruhl Libre Medium"/>
+                <a:sym typeface="Frank Ruhl Libre Medium"/>
+              </a:defRPr>
+            </a:lvl8pPr>
+            <a:lvl9pPr marR="0" lvl="8" algn="ctr" rtl="0">
+              <a:lnSpc>
+                <a:spcPct val="100000"/>
+              </a:lnSpc>
+              <a:spcBef>
+                <a:spcPts val="0"/>
+              </a:spcBef>
+              <a:spcAft>
+                <a:spcPts val="0"/>
+              </a:spcAft>
+              <a:buClr>
+                <a:srgbClr val="FFFFFF"/>
+              </a:buClr>
+              <a:buSzPts val="3600"/>
+              <a:buFont typeface="Frank Ruhl Libre Medium"/>
+              <a:buNone/>
+              <a:defRPr sz="3600" b="0" i="0" u="none" strike="noStrike" cap="none">
+                <a:solidFill>
+                  <a:srgbClr val="FFFFFF"/>
+                </a:solidFill>
+                <a:latin typeface="Frank Ruhl Libre Medium"/>
+                <a:ea typeface="Frank Ruhl Libre Medium"/>
+                <a:cs typeface="Frank Ruhl Libre Medium"/>
+                <a:sym typeface="Frank Ruhl Libre Medium"/>
+              </a:defRPr>
+            </a:lvl9pPr>
+          </a:lstStyle>
+          <a:p>
+            <a:r>
+              <a:rPr lang="en-US" sz="9600" b="1" dirty="0">
+                <a:solidFill>
+                  <a:schemeClr val="bg1"/>
+                </a:solidFill>
+                <a:latin typeface="Bahnschrift SemiLight Condensed" panose="020B0502040204020203" pitchFamily="34" charset="0"/>
               </a:rPr>
-              <a:t>Our Idea</a:t>
+              <a:t>Our idea</a:t>
             </a:r>
-            <a:endParaRPr dirty="0">
+            <a:endParaRPr lang="bg-BG" sz="9600" b="1" dirty="0">
               <a:solidFill>
-                <a:schemeClr val="accent3"/>
+                <a:schemeClr val="bg1"/>
               </a:solidFill>
-              <a:latin typeface="Oswald Medium"/>
-              <a:ea typeface="Oswald Medium"/>
-              <a:cs typeface="Oswald Medium"/>
-              <a:sym typeface="Oswald Medium"/>
+              <a:latin typeface="Bahnschrift SemiLight Condensed" panose="020B0502040204020203" pitchFamily="34" charset="0"/>
             </a:endParaRPr>
           </a:p>
         </p:txBody>
       </p:sp>
-      <p:cxnSp>
-        <p:nvCxnSpPr>
-          <p:cNvPr id="226" name="Google Shape;226;p32"/>
-          <p:cNvCxnSpPr>
-            <a:cxnSpLocks/>
-          </p:cNvCxnSpPr>
-          <p:nvPr/>
-        </p:nvCxnSpPr>
-        <p:spPr>
-          <a:xfrm>
-            <a:off x="3847113" y="2067409"/>
-            <a:ext cx="1554006" cy="0"/>
-          </a:xfrm>
-          <a:prstGeom prst="straightConnector1">
-            <a:avLst/>
-          </a:prstGeom>
-          <a:noFill/>
-          <a:ln w="19050" cap="flat" cmpd="sng">
-            <a:solidFill>
-              <a:schemeClr val="accent3"/>
-            </a:solidFill>
-            <a:prstDash val="solid"/>
-            <a:round/>
-            <a:headEnd type="none" w="med" len="med"/>
-            <a:tailEnd type="none" w="med" len="med"/>
-          </a:ln>
-        </p:spPr>
-      </p:cxnSp>
       <p:pic>
         <p:nvPicPr>
-          <p:cNvPr id="6" name="Picture 2" descr="Creative Idea Png - Have Got An Idea, Transparent Png - 1024x1024(#454) -  PngFind">
+          <p:cNvPr id="5" name="Picture 4">
             <a:extLst>
               <a:ext uri="{FF2B5EF4-FFF2-40B4-BE49-F238E27FC236}">
-                <a16:creationId xmlns:a16="http://schemas.microsoft.com/office/drawing/2014/main" id="{A28F1571-2BB5-F0E1-67F5-2EEB4C1EB98D}"/>
+                <a16:creationId xmlns:a16="http://schemas.microsoft.com/office/drawing/2014/main" id="{F8B0DC1D-93E5-4A27-A2BF-DD0CE9289B35}"/>
               </a:ext>
             </a:extLst>
           </p:cNvPr>
           <p:cNvPicPr>
-            <a:picLocks noChangeAspect="1" noChangeArrowheads="1"/>
+            <a:picLocks noChangeAspect="1"/>
           </p:cNvPicPr>
           <p:nvPr/>
         </p:nvPicPr>
         <p:blipFill>
-          <a:blip r:embed="rId3">
-            <a:extLst>
-              <a:ext uri="{28A0092B-C50C-407E-A947-70E740481C1C}">
-                <a14:useLocalDpi xmlns:a14="http://schemas.microsoft.com/office/drawing/2010/main" val="0"/>
-              </a:ext>
-            </a:extLst>
-          </a:blip>
-          <a:srcRect/>
+          <a:blip r:embed="rId3"/>
           <a:stretch>
             <a:fillRect/>
           </a:stretch>
         </p:blipFill>
-        <p:spPr bwMode="auto">
+        <p:spPr>
           <a:xfrm>
-            <a:off x="2856793" y="1824282"/>
-            <a:ext cx="3430414" cy="3025035"/>
+            <a:off x="2504514" y="1203511"/>
+            <a:ext cx="3812242" cy="3812242"/>
           </a:xfrm>
-          <a:prstGeom prst="ellipse">
+          <a:prstGeom prst="rect">
             <a:avLst/>
           </a:prstGeom>
-          <a:noFill/>
-          <a:extLst>
-            <a:ext uri="{909E8E84-426E-40DD-AFC4-6F175D3DCCD1}">
-              <a14:hiddenFill xmlns:a14="http://schemas.microsoft.com/office/drawing/2010/main">
-                <a:solidFill>
-                  <a:srgbClr val="FFFFFF"/>
-                </a:solidFill>
-              </a14:hiddenFill>
-            </a:ext>
-          </a:extLst>
         </p:spPr>
       </p:pic>
     </p:spTree>
@@ -11537,55 +12383,13 @@
       </p:grpSpPr>
       <p:sp>
         <p:nvSpPr>
-          <p:cNvPr id="393" name="Google Shape;393;p35"/>
-          <p:cNvSpPr txBox="1">
-            <a:spLocks noGrp="1"/>
-          </p:cNvSpPr>
-          <p:nvPr>
-            <p:ph type="title"/>
-          </p:nvPr>
-        </p:nvSpPr>
-        <p:spPr>
-          <a:xfrm>
-            <a:off x="3060078" y="539287"/>
-            <a:ext cx="3023843" cy="468900"/>
-          </a:xfrm>
-          <a:prstGeom prst="rect">
-            <a:avLst/>
-          </a:prstGeom>
-        </p:spPr>
-        <p:txBody>
-          <a:bodyPr spcFirstLastPara="1" wrap="square" lIns="91425" tIns="91425" rIns="91425" bIns="91425" anchor="t" anchorCtr="0">
-            <a:noAutofit/>
-          </a:bodyPr>
-          <a:lstStyle/>
-          <a:p>
-            <a:pPr marL="0" lvl="0" indent="0" algn="l" rtl="0">
-              <a:spcBef>
-                <a:spcPts val="0"/>
-              </a:spcBef>
-              <a:spcAft>
-                <a:spcPts val="0"/>
-              </a:spcAft>
-              <a:buNone/>
-            </a:pPr>
-            <a:r>
-              <a:rPr lang="en-US" dirty="0"/>
-              <a:t>Stages of realization</a:t>
-            </a:r>
-            <a:endParaRPr dirty="0"/>
-          </a:p>
-        </p:txBody>
-      </p:sp>
-      <p:sp>
-        <p:nvSpPr>
           <p:cNvPr id="394" name="Google Shape;394;p35"/>
           <p:cNvSpPr txBox="1"/>
           <p:nvPr/>
         </p:nvSpPr>
         <p:spPr>
           <a:xfrm>
-            <a:off x="953423" y="3262663"/>
+            <a:off x="953423" y="3260912"/>
             <a:ext cx="1866000" cy="453077"/>
           </a:xfrm>
           <a:prstGeom prst="rect">
@@ -11612,7 +12416,7 @@
               <a:buNone/>
             </a:pPr>
             <a:r>
-              <a:rPr lang="en-US" sz="1300" dirty="0">
+              <a:rPr lang="en-US" sz="2000" dirty="0">
                 <a:solidFill>
                   <a:srgbClr val="FFFFFF"/>
                 </a:solidFill>
@@ -11623,7 +12427,7 @@
               </a:rPr>
               <a:t>Planning</a:t>
             </a:r>
-            <a:endParaRPr sz="1300" dirty="0">
+            <a:endParaRPr sz="2000" dirty="0">
               <a:solidFill>
                 <a:srgbClr val="FFFFFF"/>
               </a:solidFill>
@@ -11670,7 +12474,7 @@
               <a:buNone/>
             </a:pPr>
             <a:r>
-              <a:rPr lang="en" sz="1700" dirty="0">
+              <a:rPr lang="en" sz="2800" dirty="0">
                 <a:solidFill>
                   <a:schemeClr val="accent2"/>
                 </a:solidFill>
@@ -11681,7 +12485,7 @@
               </a:rPr>
               <a:t>STEP 1</a:t>
             </a:r>
-            <a:endParaRPr sz="1700" dirty="0">
+            <a:endParaRPr sz="2800" dirty="0">
               <a:solidFill>
                 <a:schemeClr val="accent2"/>
               </a:solidFill>
@@ -11728,7 +12532,7 @@
               <a:buNone/>
             </a:pPr>
             <a:r>
-              <a:rPr lang="en-US" sz="1300" dirty="0">
+              <a:rPr lang="en-US" sz="2000" dirty="0">
                 <a:solidFill>
                   <a:srgbClr val="FFFFFF"/>
                 </a:solidFill>
@@ -11739,7 +12543,7 @@
               </a:rPr>
               <a:t>Realization</a:t>
             </a:r>
-            <a:endParaRPr lang="bg-BG" sz="1300" dirty="0">
+            <a:endParaRPr lang="bg-BG" sz="2000" dirty="0">
               <a:solidFill>
                 <a:srgbClr val="FFFFFF"/>
               </a:solidFill>
@@ -11759,7 +12563,7 @@
         </p:nvSpPr>
         <p:spPr>
           <a:xfrm>
-            <a:off x="3560327" y="2234023"/>
+            <a:off x="3606926" y="2216955"/>
             <a:ext cx="1866000" cy="373500"/>
           </a:xfrm>
           <a:prstGeom prst="rect">
@@ -11786,7 +12590,7 @@
               <a:buNone/>
             </a:pPr>
             <a:r>
-              <a:rPr lang="en" sz="1700" dirty="0">
+              <a:rPr lang="en" sz="2800" dirty="0">
                 <a:solidFill>
                   <a:schemeClr val="accent2"/>
                 </a:solidFill>
@@ -11797,7 +12601,7 @@
               </a:rPr>
               <a:t>STEP 2</a:t>
             </a:r>
-            <a:endParaRPr sz="1700" dirty="0">
+            <a:endParaRPr sz="2800" dirty="0">
               <a:solidFill>
                 <a:schemeClr val="accent2"/>
               </a:solidFill>
@@ -11844,7 +12648,7 @@
               <a:buNone/>
             </a:pPr>
             <a:r>
-              <a:rPr lang="en" sz="1300" dirty="0">
+              <a:rPr lang="en" sz="2000" dirty="0">
                 <a:solidFill>
                   <a:srgbClr val="FFFFFF"/>
                 </a:solidFill>
@@ -11853,9 +12657,9 @@
                 <a:cs typeface="Roboto Medium"/>
                 <a:sym typeface="Roboto Medium"/>
               </a:rPr>
-              <a:t>Despite being red, </a:t>
+              <a:t>Presentation</a:t>
             </a:r>
-            <a:endParaRPr sz="1300" dirty="0">
+            <a:endParaRPr sz="2000" dirty="0">
               <a:solidFill>
                 <a:srgbClr val="FFFFFF"/>
               </a:solidFill>
@@ -11902,7 +12706,7 @@
               <a:buNone/>
             </a:pPr>
             <a:r>
-              <a:rPr lang="en" sz="1700" dirty="0">
+              <a:rPr lang="en" sz="2800" dirty="0">
                 <a:solidFill>
                   <a:schemeClr val="accent2"/>
                 </a:solidFill>
@@ -11913,7 +12717,7 @@
               </a:rPr>
               <a:t>STEP 3</a:t>
             </a:r>
-            <a:endParaRPr sz="1700" dirty="0">
+            <a:endParaRPr sz="2800" dirty="0">
               <a:solidFill>
                 <a:schemeClr val="accent2"/>
               </a:solidFill>
@@ -11999,7 +12803,7 @@
         </p:blipFill>
         <p:spPr>
           <a:xfrm>
-            <a:off x="1627321" y="2637157"/>
+            <a:off x="1616657" y="2735592"/>
             <a:ext cx="518205" cy="536494"/>
           </a:xfrm>
           <a:prstGeom prst="rect">
@@ -12029,7 +12833,7 @@
         </p:blipFill>
         <p:spPr>
           <a:xfrm>
-            <a:off x="4197646" y="2624963"/>
+            <a:off x="4244244" y="2747611"/>
             <a:ext cx="591363" cy="548688"/>
           </a:xfrm>
           <a:prstGeom prst="rect">
@@ -12059,7 +12863,7 @@
         </p:blipFill>
         <p:spPr>
           <a:xfrm>
-            <a:off x="6944990" y="2551258"/>
+            <a:off x="7019810" y="2683598"/>
             <a:ext cx="475529" cy="676715"/>
           </a:xfrm>
           <a:prstGeom prst="rect">
@@ -12067,6 +12871,303 @@
           </a:prstGeom>
         </p:spPr>
       </p:pic>
+      <p:sp>
+        <p:nvSpPr>
+          <p:cNvPr id="14" name="Title 1">
+            <a:extLst>
+              <a:ext uri="{FF2B5EF4-FFF2-40B4-BE49-F238E27FC236}">
+                <a16:creationId xmlns:a16="http://schemas.microsoft.com/office/drawing/2014/main" id="{EFF5678C-240F-4986-8F63-C1F593E9827D}"/>
+              </a:ext>
+            </a:extLst>
+          </p:cNvPr>
+          <p:cNvSpPr txBox="1">
+            <a:spLocks/>
+          </p:cNvSpPr>
+          <p:nvPr/>
+        </p:nvSpPr>
+        <p:spPr>
+          <a:xfrm>
+            <a:off x="1021504" y="254689"/>
+            <a:ext cx="8175812" cy="1742905"/>
+          </a:xfrm>
+          <a:prstGeom prst="rect">
+            <a:avLst/>
+          </a:prstGeom>
+          <a:noFill/>
+          <a:ln>
+            <a:noFill/>
+          </a:ln>
+        </p:spPr>
+        <p:txBody>
+          <a:bodyPr spcFirstLastPara="1" wrap="square" lIns="91425" tIns="91425" rIns="91425" bIns="91425" anchor="t" anchorCtr="0">
+            <a:noAutofit/>
+          </a:bodyPr>
+          <a:lstStyle>
+            <a:defPPr marR="0" lvl="0" algn="l" rtl="0">
+              <a:lnSpc>
+                <a:spcPct val="100000"/>
+              </a:lnSpc>
+              <a:spcBef>
+                <a:spcPts val="0"/>
+              </a:spcBef>
+              <a:spcAft>
+                <a:spcPts val="0"/>
+              </a:spcAft>
+            </a:defPPr>
+            <a:lvl1pPr marR="0" lvl="0" algn="l" rtl="0">
+              <a:lnSpc>
+                <a:spcPct val="100000"/>
+              </a:lnSpc>
+              <a:spcBef>
+                <a:spcPts val="0"/>
+              </a:spcBef>
+              <a:spcAft>
+                <a:spcPts val="0"/>
+              </a:spcAft>
+              <a:buClr>
+                <a:schemeClr val="accent3"/>
+              </a:buClr>
+              <a:buSzPts val="2800"/>
+              <a:buFont typeface="Oswald Medium"/>
+              <a:buNone/>
+              <a:defRPr sz="2800" b="0" i="0" u="none" strike="noStrike" cap="none">
+                <a:solidFill>
+                  <a:schemeClr val="accent3"/>
+                </a:solidFill>
+                <a:latin typeface="Oswald Medium"/>
+                <a:ea typeface="Oswald Medium"/>
+                <a:cs typeface="Oswald Medium"/>
+                <a:sym typeface="Oswald Medium"/>
+              </a:defRPr>
+            </a:lvl1pPr>
+            <a:lvl2pPr marR="0" lvl="1" algn="l" rtl="0">
+              <a:lnSpc>
+                <a:spcPct val="100000"/>
+              </a:lnSpc>
+              <a:spcBef>
+                <a:spcPts val="0"/>
+              </a:spcBef>
+              <a:spcAft>
+                <a:spcPts val="0"/>
+              </a:spcAft>
+              <a:buClr>
+                <a:schemeClr val="accent3"/>
+              </a:buClr>
+              <a:buSzPts val="2800"/>
+              <a:buFont typeface="Frank Ruhl Libre Medium"/>
+              <a:buNone/>
+              <a:defRPr sz="2800" b="0" i="0" u="none" strike="noStrike" cap="none">
+                <a:solidFill>
+                  <a:schemeClr val="accent3"/>
+                </a:solidFill>
+                <a:latin typeface="Frank Ruhl Libre Medium"/>
+                <a:ea typeface="Frank Ruhl Libre Medium"/>
+                <a:cs typeface="Frank Ruhl Libre Medium"/>
+                <a:sym typeface="Frank Ruhl Libre Medium"/>
+              </a:defRPr>
+            </a:lvl2pPr>
+            <a:lvl3pPr marR="0" lvl="2" algn="l" rtl="0">
+              <a:lnSpc>
+                <a:spcPct val="100000"/>
+              </a:lnSpc>
+              <a:spcBef>
+                <a:spcPts val="0"/>
+              </a:spcBef>
+              <a:spcAft>
+                <a:spcPts val="0"/>
+              </a:spcAft>
+              <a:buClr>
+                <a:schemeClr val="accent3"/>
+              </a:buClr>
+              <a:buSzPts val="2800"/>
+              <a:buFont typeface="Frank Ruhl Libre Medium"/>
+              <a:buNone/>
+              <a:defRPr sz="2800" b="0" i="0" u="none" strike="noStrike" cap="none">
+                <a:solidFill>
+                  <a:schemeClr val="accent3"/>
+                </a:solidFill>
+                <a:latin typeface="Frank Ruhl Libre Medium"/>
+                <a:ea typeface="Frank Ruhl Libre Medium"/>
+                <a:cs typeface="Frank Ruhl Libre Medium"/>
+                <a:sym typeface="Frank Ruhl Libre Medium"/>
+              </a:defRPr>
+            </a:lvl3pPr>
+            <a:lvl4pPr marR="0" lvl="3" algn="l" rtl="0">
+              <a:lnSpc>
+                <a:spcPct val="100000"/>
+              </a:lnSpc>
+              <a:spcBef>
+                <a:spcPts val="0"/>
+              </a:spcBef>
+              <a:spcAft>
+                <a:spcPts val="0"/>
+              </a:spcAft>
+              <a:buClr>
+                <a:schemeClr val="accent3"/>
+              </a:buClr>
+              <a:buSzPts val="2800"/>
+              <a:buFont typeface="Frank Ruhl Libre Medium"/>
+              <a:buNone/>
+              <a:defRPr sz="2800" b="0" i="0" u="none" strike="noStrike" cap="none">
+                <a:solidFill>
+                  <a:schemeClr val="accent3"/>
+                </a:solidFill>
+                <a:latin typeface="Frank Ruhl Libre Medium"/>
+                <a:ea typeface="Frank Ruhl Libre Medium"/>
+                <a:cs typeface="Frank Ruhl Libre Medium"/>
+                <a:sym typeface="Frank Ruhl Libre Medium"/>
+              </a:defRPr>
+            </a:lvl4pPr>
+            <a:lvl5pPr marR="0" lvl="4" algn="l" rtl="0">
+              <a:lnSpc>
+                <a:spcPct val="100000"/>
+              </a:lnSpc>
+              <a:spcBef>
+                <a:spcPts val="0"/>
+              </a:spcBef>
+              <a:spcAft>
+                <a:spcPts val="0"/>
+              </a:spcAft>
+              <a:buClr>
+                <a:schemeClr val="accent3"/>
+              </a:buClr>
+              <a:buSzPts val="2800"/>
+              <a:buFont typeface="Frank Ruhl Libre Medium"/>
+              <a:buNone/>
+              <a:defRPr sz="2800" b="0" i="0" u="none" strike="noStrike" cap="none">
+                <a:solidFill>
+                  <a:schemeClr val="accent3"/>
+                </a:solidFill>
+                <a:latin typeface="Frank Ruhl Libre Medium"/>
+                <a:ea typeface="Frank Ruhl Libre Medium"/>
+                <a:cs typeface="Frank Ruhl Libre Medium"/>
+                <a:sym typeface="Frank Ruhl Libre Medium"/>
+              </a:defRPr>
+            </a:lvl5pPr>
+            <a:lvl6pPr marR="0" lvl="5" algn="l" rtl="0">
+              <a:lnSpc>
+                <a:spcPct val="100000"/>
+              </a:lnSpc>
+              <a:spcBef>
+                <a:spcPts val="0"/>
+              </a:spcBef>
+              <a:spcAft>
+                <a:spcPts val="0"/>
+              </a:spcAft>
+              <a:buClr>
+                <a:schemeClr val="accent3"/>
+              </a:buClr>
+              <a:buSzPts val="2800"/>
+              <a:buFont typeface="Frank Ruhl Libre Medium"/>
+              <a:buNone/>
+              <a:defRPr sz="2800" b="0" i="0" u="none" strike="noStrike" cap="none">
+                <a:solidFill>
+                  <a:schemeClr val="accent3"/>
+                </a:solidFill>
+                <a:latin typeface="Frank Ruhl Libre Medium"/>
+                <a:ea typeface="Frank Ruhl Libre Medium"/>
+                <a:cs typeface="Frank Ruhl Libre Medium"/>
+                <a:sym typeface="Frank Ruhl Libre Medium"/>
+              </a:defRPr>
+            </a:lvl6pPr>
+            <a:lvl7pPr marR="0" lvl="6" algn="l" rtl="0">
+              <a:lnSpc>
+                <a:spcPct val="100000"/>
+              </a:lnSpc>
+              <a:spcBef>
+                <a:spcPts val="0"/>
+              </a:spcBef>
+              <a:spcAft>
+                <a:spcPts val="0"/>
+              </a:spcAft>
+              <a:buClr>
+                <a:schemeClr val="accent3"/>
+              </a:buClr>
+              <a:buSzPts val="2800"/>
+              <a:buFont typeface="Frank Ruhl Libre Medium"/>
+              <a:buNone/>
+              <a:defRPr sz="2800" b="0" i="0" u="none" strike="noStrike" cap="none">
+                <a:solidFill>
+                  <a:schemeClr val="accent3"/>
+                </a:solidFill>
+                <a:latin typeface="Frank Ruhl Libre Medium"/>
+                <a:ea typeface="Frank Ruhl Libre Medium"/>
+                <a:cs typeface="Frank Ruhl Libre Medium"/>
+                <a:sym typeface="Frank Ruhl Libre Medium"/>
+              </a:defRPr>
+            </a:lvl7pPr>
+            <a:lvl8pPr marR="0" lvl="7" algn="l" rtl="0">
+              <a:lnSpc>
+                <a:spcPct val="100000"/>
+              </a:lnSpc>
+              <a:spcBef>
+                <a:spcPts val="0"/>
+              </a:spcBef>
+              <a:spcAft>
+                <a:spcPts val="0"/>
+              </a:spcAft>
+              <a:buClr>
+                <a:schemeClr val="accent3"/>
+              </a:buClr>
+              <a:buSzPts val="2800"/>
+              <a:buFont typeface="Frank Ruhl Libre Medium"/>
+              <a:buNone/>
+              <a:defRPr sz="2800" b="0" i="0" u="none" strike="noStrike" cap="none">
+                <a:solidFill>
+                  <a:schemeClr val="accent3"/>
+                </a:solidFill>
+                <a:latin typeface="Frank Ruhl Libre Medium"/>
+                <a:ea typeface="Frank Ruhl Libre Medium"/>
+                <a:cs typeface="Frank Ruhl Libre Medium"/>
+                <a:sym typeface="Frank Ruhl Libre Medium"/>
+              </a:defRPr>
+            </a:lvl8pPr>
+            <a:lvl9pPr marR="0" lvl="8" algn="l" rtl="0">
+              <a:lnSpc>
+                <a:spcPct val="100000"/>
+              </a:lnSpc>
+              <a:spcBef>
+                <a:spcPts val="0"/>
+              </a:spcBef>
+              <a:spcAft>
+                <a:spcPts val="0"/>
+              </a:spcAft>
+              <a:buClr>
+                <a:schemeClr val="accent3"/>
+              </a:buClr>
+              <a:buSzPts val="2800"/>
+              <a:buFont typeface="Frank Ruhl Libre Medium"/>
+              <a:buNone/>
+              <a:defRPr sz="2800" b="0" i="0" u="none" strike="noStrike" cap="none">
+                <a:solidFill>
+                  <a:schemeClr val="accent3"/>
+                </a:solidFill>
+                <a:latin typeface="Frank Ruhl Libre Medium"/>
+                <a:ea typeface="Frank Ruhl Libre Medium"/>
+                <a:cs typeface="Frank Ruhl Libre Medium"/>
+                <a:sym typeface="Frank Ruhl Libre Medium"/>
+              </a:defRPr>
+            </a:lvl9pPr>
+          </a:lstStyle>
+          <a:p>
+            <a:r>
+              <a:rPr lang="en-US" sz="8000" b="1" dirty="0">
+                <a:solidFill>
+                  <a:schemeClr val="bg1"/>
+                </a:solidFill>
+                <a:latin typeface="Bahnschrift SemiLight Condensed" panose="020B0502040204020203" pitchFamily="34" charset="0"/>
+              </a:rPr>
+              <a:t>Stages of realization</a:t>
+            </a:r>
+            <a:endParaRPr lang="bg-BG" sz="8000" b="1" dirty="0">
+              <a:solidFill>
+                <a:schemeClr val="bg1"/>
+              </a:solidFill>
+              <a:latin typeface="Bahnschrift SemiLight Condensed" panose="020B0502040204020203" pitchFamily="34" charset="0"/>
+            </a:endParaRPr>
+          </a:p>
+        </p:txBody>
+      </p:sp>
     </p:spTree>
   </p:cSld>
   <p:clrMapOvr>
@@ -12092,42 +13193,6 @@
           <a:chExt cx="0" cy="0"/>
         </a:xfrm>
       </p:grpSpPr>
-      <p:sp>
-        <p:nvSpPr>
-          <p:cNvPr id="2" name="Title 1">
-            <a:extLst>
-              <a:ext uri="{FF2B5EF4-FFF2-40B4-BE49-F238E27FC236}">
-                <a16:creationId xmlns:a16="http://schemas.microsoft.com/office/drawing/2014/main" id="{D2D06F14-133A-DC92-D5BC-5BF9CBD24F9C}"/>
-              </a:ext>
-            </a:extLst>
-          </p:cNvPr>
-          <p:cNvSpPr>
-            <a:spLocks noGrp="1"/>
-          </p:cNvSpPr>
-          <p:nvPr>
-            <p:ph type="ctrTitle"/>
-          </p:nvPr>
-        </p:nvSpPr>
-        <p:spPr>
-          <a:xfrm>
-            <a:off x="2788606" y="586172"/>
-            <a:ext cx="3566786" cy="1062567"/>
-          </a:xfrm>
-        </p:spPr>
-        <p:txBody>
-          <a:bodyPr>
-            <a:normAutofit/>
-          </a:bodyPr>
-          <a:lstStyle/>
-          <a:p>
-            <a:r>
-              <a:rPr lang="en-US" sz="2800" b="1" dirty="0"/>
-              <a:t>Used languages</a:t>
-            </a:r>
-            <a:endParaRPr lang="bg-BG" sz="2800" b="1" dirty="0"/>
-          </a:p>
-        </p:txBody>
-      </p:sp>
       <p:sp>
         <p:nvSpPr>
           <p:cNvPr id="3" name="Subtitle 2">
@@ -12163,10 +13228,10 @@
       </p:sp>
       <p:pic>
         <p:nvPicPr>
-          <p:cNvPr id="2056" name="Picture 8" descr="CSS">
+          <p:cNvPr id="2090" name="Picture 42">
             <a:extLst>
               <a:ext uri="{FF2B5EF4-FFF2-40B4-BE49-F238E27FC236}">
-                <a16:creationId xmlns:a16="http://schemas.microsoft.com/office/drawing/2014/main" id="{9217F93C-0B50-5EF2-C500-56D0B0093136}"/>
+                <a16:creationId xmlns:a16="http://schemas.microsoft.com/office/drawing/2014/main" id="{00C8AD86-66A9-6F6D-BB45-C0527F48291E}"/>
               </a:ext>
             </a:extLst>
           </p:cNvPr>
@@ -12190,8 +13255,8 @@
         </p:blipFill>
         <p:spPr bwMode="auto">
           <a:xfrm>
-            <a:off x="2903766" y="3499459"/>
-            <a:ext cx="858928" cy="1133049"/>
+            <a:off x="1587796" y="2003381"/>
+            <a:ext cx="1011222" cy="1136737"/>
           </a:xfrm>
           <a:prstGeom prst="rect">
             <a:avLst/>
@@ -12210,10 +13275,10 @@
       </p:pic>
       <p:pic>
         <p:nvPicPr>
-          <p:cNvPr id="2058" name="Picture 10" descr="GoogleTest">
+          <p:cNvPr id="2098" name="Picture 50">
             <a:extLst>
               <a:ext uri="{FF2B5EF4-FFF2-40B4-BE49-F238E27FC236}">
-                <a16:creationId xmlns:a16="http://schemas.microsoft.com/office/drawing/2014/main" id="{C390276B-9861-47D6-30D6-F145249F5AFD}"/>
+                <a16:creationId xmlns:a16="http://schemas.microsoft.com/office/drawing/2014/main" id="{9C4A3589-BB0E-CF2C-8CE4-9BF590E94B65}"/>
               </a:ext>
             </a:extLst>
           </p:cNvPr>
@@ -12237,148 +13302,7 @@
         </p:blipFill>
         <p:spPr bwMode="auto">
           <a:xfrm>
-            <a:off x="4142535" y="2003381"/>
-            <a:ext cx="858928" cy="1136737"/>
-          </a:xfrm>
-          <a:prstGeom prst="rect">
-            <a:avLst/>
-          </a:prstGeom>
-          <a:noFill/>
-          <a:extLst>
-            <a:ext uri="{909E8E84-426E-40DD-AFC4-6F175D3DCCD1}">
-              <a14:hiddenFill xmlns:a14="http://schemas.microsoft.com/office/drawing/2010/main">
-                <a:solidFill>
-                  <a:srgbClr val="FFFFFF"/>
-                </a:solidFill>
-              </a14:hiddenFill>
-            </a:ext>
-          </a:extLst>
-        </p:spPr>
-      </p:pic>
-      <p:pic>
-        <p:nvPicPr>
-          <p:cNvPr id="2090" name="Picture 42">
-            <a:extLst>
-              <a:ext uri="{FF2B5EF4-FFF2-40B4-BE49-F238E27FC236}">
-                <a16:creationId xmlns:a16="http://schemas.microsoft.com/office/drawing/2014/main" id="{00C8AD86-66A9-6F6D-BB45-C0527F48291E}"/>
-              </a:ext>
-            </a:extLst>
-          </p:cNvPr>
-          <p:cNvPicPr>
-            <a:picLocks noChangeAspect="1" noChangeArrowheads="1"/>
-          </p:cNvPicPr>
-          <p:nvPr/>
-        </p:nvPicPr>
-        <p:blipFill>
-          <a:blip r:embed="rId4">
-            <a:extLst>
-              <a:ext uri="{28A0092B-C50C-407E-A947-70E740481C1C}">
-                <a14:useLocalDpi xmlns:a14="http://schemas.microsoft.com/office/drawing/2010/main" val="0"/>
-              </a:ext>
-            </a:extLst>
-          </a:blip>
-          <a:srcRect/>
-          <a:stretch>
-            <a:fillRect/>
-          </a:stretch>
-        </p:blipFill>
-        <p:spPr bwMode="auto">
-          <a:xfrm>
-            <a:off x="1587796" y="2003381"/>
-            <a:ext cx="1011222" cy="1136737"/>
-          </a:xfrm>
-          <a:prstGeom prst="rect">
-            <a:avLst/>
-          </a:prstGeom>
-          <a:noFill/>
-          <a:extLst>
-            <a:ext uri="{909E8E84-426E-40DD-AFC4-6F175D3DCCD1}">
-              <a14:hiddenFill xmlns:a14="http://schemas.microsoft.com/office/drawing/2010/main">
-                <a:solidFill>
-                  <a:srgbClr val="FFFFFF"/>
-                </a:solidFill>
-              </a14:hiddenFill>
-            </a:ext>
-          </a:extLst>
-        </p:spPr>
-      </p:pic>
-      <p:pic>
-        <p:nvPicPr>
-          <p:cNvPr id="2096" name="Picture 48" descr="HTML 5">
-            <a:extLst>
-              <a:ext uri="{FF2B5EF4-FFF2-40B4-BE49-F238E27FC236}">
-                <a16:creationId xmlns:a16="http://schemas.microsoft.com/office/drawing/2014/main" id="{8D8A72FA-DED6-EC29-9591-830A0A5F2250}"/>
-              </a:ext>
-            </a:extLst>
-          </p:cNvPr>
-          <p:cNvPicPr>
-            <a:picLocks noChangeAspect="1" noChangeArrowheads="1"/>
-          </p:cNvPicPr>
-          <p:nvPr/>
-        </p:nvPicPr>
-        <p:blipFill>
-          <a:blip r:embed="rId5">
-            <a:extLst>
-              <a:ext uri="{28A0092B-C50C-407E-A947-70E740481C1C}">
-                <a14:useLocalDpi xmlns:a14="http://schemas.microsoft.com/office/drawing/2010/main" val="0"/>
-              </a:ext>
-            </a:extLst>
-          </a:blip>
-          <a:srcRect/>
-          <a:stretch>
-            <a:fillRect/>
-          </a:stretch>
-        </p:blipFill>
-        <p:spPr bwMode="auto">
-          <a:xfrm>
-            <a:off x="6544981" y="2003381"/>
-            <a:ext cx="1178561" cy="1136737"/>
-          </a:xfrm>
-          <a:prstGeom prst="rect">
-            <a:avLst/>
-          </a:prstGeom>
-          <a:noFill/>
-          <a:extLst>
-            <a:ext uri="{909E8E84-426E-40DD-AFC4-6F175D3DCCD1}">
-              <a14:hiddenFill xmlns:a14="http://schemas.microsoft.com/office/drawing/2010/main">
-                <a:solidFill>
-                  <a:srgbClr val="FFFFFF"/>
-                </a:solidFill>
-              </a14:hiddenFill>
-            </a:ext>
-          </a:extLst>
-        </p:spPr>
-      </p:pic>
-      <p:pic>
-        <p:nvPicPr>
-          <p:cNvPr id="2098" name="Picture 50">
-            <a:extLst>
-              <a:ext uri="{FF2B5EF4-FFF2-40B4-BE49-F238E27FC236}">
-                <a16:creationId xmlns:a16="http://schemas.microsoft.com/office/drawing/2014/main" id="{9C4A3589-BB0E-CF2C-8CE4-9BF590E94B65}"/>
-              </a:ext>
-            </a:extLst>
-          </p:cNvPr>
-          <p:cNvPicPr>
-            <a:picLocks noChangeAspect="1" noChangeArrowheads="1"/>
-          </p:cNvPicPr>
-          <p:nvPr/>
-        </p:nvPicPr>
-        <p:blipFill>
-          <a:blip r:embed="rId6">
-            <a:extLst>
-              <a:ext uri="{28A0092B-C50C-407E-A947-70E740481C1C}">
-                <a14:useLocalDpi xmlns:a14="http://schemas.microsoft.com/office/drawing/2010/main" val="0"/>
-              </a:ext>
-            </a:extLst>
-          </a:blip>
-          <a:srcRect/>
-          <a:stretch>
-            <a:fillRect/>
-          </a:stretch>
-        </p:blipFill>
-        <p:spPr bwMode="auto">
-          <a:xfrm>
-            <a:off x="5381308" y="3530716"/>
+            <a:off x="5633866" y="3433018"/>
             <a:ext cx="1241822" cy="1101792"/>
           </a:xfrm>
           <a:prstGeom prst="rect">
@@ -12394,6 +13318,393 @@
               </a14:hiddenFill>
             </a:ext>
           </a:extLst>
+        </p:spPr>
+      </p:pic>
+      <p:sp>
+        <p:nvSpPr>
+          <p:cNvPr id="9" name="Title 1">
+            <a:extLst>
+              <a:ext uri="{FF2B5EF4-FFF2-40B4-BE49-F238E27FC236}">
+                <a16:creationId xmlns:a16="http://schemas.microsoft.com/office/drawing/2014/main" id="{147004C2-0905-4E04-9328-2DA8E4585EA9}"/>
+              </a:ext>
+            </a:extLst>
+          </p:cNvPr>
+          <p:cNvSpPr txBox="1">
+            <a:spLocks/>
+          </p:cNvSpPr>
+          <p:nvPr/>
+        </p:nvSpPr>
+        <p:spPr>
+          <a:xfrm>
+            <a:off x="1223682" y="-40111"/>
+            <a:ext cx="6858000" cy="1742905"/>
+          </a:xfrm>
+          <a:prstGeom prst="rect">
+            <a:avLst/>
+          </a:prstGeom>
+          <a:noFill/>
+          <a:ln>
+            <a:noFill/>
+          </a:ln>
+        </p:spPr>
+        <p:txBody>
+          <a:bodyPr spcFirstLastPara="1" wrap="square" lIns="91425" tIns="91425" rIns="91425" bIns="91425" anchor="b" anchorCtr="0">
+            <a:noAutofit/>
+          </a:bodyPr>
+          <a:lstStyle>
+            <a:defPPr marR="0" lvl="0" algn="l" rtl="0">
+              <a:lnSpc>
+                <a:spcPct val="100000"/>
+              </a:lnSpc>
+              <a:spcBef>
+                <a:spcPts val="0"/>
+              </a:spcBef>
+              <a:spcAft>
+                <a:spcPts val="0"/>
+              </a:spcAft>
+            </a:defPPr>
+            <a:lvl1pPr marR="0" lvl="0" algn="ctr" rtl="0">
+              <a:lnSpc>
+                <a:spcPct val="100000"/>
+              </a:lnSpc>
+              <a:spcBef>
+                <a:spcPts val="0"/>
+              </a:spcBef>
+              <a:spcAft>
+                <a:spcPts val="0"/>
+              </a:spcAft>
+              <a:buClr>
+                <a:schemeClr val="dk1"/>
+              </a:buClr>
+              <a:buSzPts val="5200"/>
+              <a:buFont typeface="Oswald Medium"/>
+              <a:buNone/>
+              <a:defRPr sz="6600" b="0" i="0" u="none" strike="noStrike" cap="none">
+                <a:solidFill>
+                  <a:schemeClr val="dk1"/>
+                </a:solidFill>
+                <a:latin typeface="Oswald Medium"/>
+                <a:ea typeface="Oswald Medium"/>
+                <a:cs typeface="Oswald Medium"/>
+                <a:sym typeface="Oswald Medium"/>
+              </a:defRPr>
+            </a:lvl1pPr>
+            <a:lvl2pPr marR="0" lvl="1" algn="ctr" rtl="0">
+              <a:lnSpc>
+                <a:spcPct val="100000"/>
+              </a:lnSpc>
+              <a:spcBef>
+                <a:spcPts val="0"/>
+              </a:spcBef>
+              <a:spcAft>
+                <a:spcPts val="0"/>
+              </a:spcAft>
+              <a:buClr>
+                <a:schemeClr val="dk1"/>
+              </a:buClr>
+              <a:buSzPts val="5200"/>
+              <a:buFont typeface="Oswald Medium"/>
+              <a:buNone/>
+              <a:defRPr sz="5200" b="0" i="0" u="none" strike="noStrike" cap="none">
+                <a:solidFill>
+                  <a:schemeClr val="dk1"/>
+                </a:solidFill>
+                <a:latin typeface="Oswald Medium"/>
+                <a:ea typeface="Oswald Medium"/>
+                <a:cs typeface="Oswald Medium"/>
+                <a:sym typeface="Oswald Medium"/>
+              </a:defRPr>
+            </a:lvl2pPr>
+            <a:lvl3pPr marR="0" lvl="2" algn="ctr" rtl="0">
+              <a:lnSpc>
+                <a:spcPct val="100000"/>
+              </a:lnSpc>
+              <a:spcBef>
+                <a:spcPts val="0"/>
+              </a:spcBef>
+              <a:spcAft>
+                <a:spcPts val="0"/>
+              </a:spcAft>
+              <a:buClr>
+                <a:schemeClr val="dk1"/>
+              </a:buClr>
+              <a:buSzPts val="5200"/>
+              <a:buFont typeface="Oswald Medium"/>
+              <a:buNone/>
+              <a:defRPr sz="5200" b="0" i="0" u="none" strike="noStrike" cap="none">
+                <a:solidFill>
+                  <a:schemeClr val="dk1"/>
+                </a:solidFill>
+                <a:latin typeface="Oswald Medium"/>
+                <a:ea typeface="Oswald Medium"/>
+                <a:cs typeface="Oswald Medium"/>
+                <a:sym typeface="Oswald Medium"/>
+              </a:defRPr>
+            </a:lvl3pPr>
+            <a:lvl4pPr marR="0" lvl="3" algn="ctr" rtl="0">
+              <a:lnSpc>
+                <a:spcPct val="100000"/>
+              </a:lnSpc>
+              <a:spcBef>
+                <a:spcPts val="0"/>
+              </a:spcBef>
+              <a:spcAft>
+                <a:spcPts val="0"/>
+              </a:spcAft>
+              <a:buClr>
+                <a:schemeClr val="dk1"/>
+              </a:buClr>
+              <a:buSzPts val="5200"/>
+              <a:buFont typeface="Oswald Medium"/>
+              <a:buNone/>
+              <a:defRPr sz="5200" b="0" i="0" u="none" strike="noStrike" cap="none">
+                <a:solidFill>
+                  <a:schemeClr val="dk1"/>
+                </a:solidFill>
+                <a:latin typeface="Oswald Medium"/>
+                <a:ea typeface="Oswald Medium"/>
+                <a:cs typeface="Oswald Medium"/>
+                <a:sym typeface="Oswald Medium"/>
+              </a:defRPr>
+            </a:lvl4pPr>
+            <a:lvl5pPr marR="0" lvl="4" algn="ctr" rtl="0">
+              <a:lnSpc>
+                <a:spcPct val="100000"/>
+              </a:lnSpc>
+              <a:spcBef>
+                <a:spcPts val="0"/>
+              </a:spcBef>
+              <a:spcAft>
+                <a:spcPts val="0"/>
+              </a:spcAft>
+              <a:buClr>
+                <a:schemeClr val="dk1"/>
+              </a:buClr>
+              <a:buSzPts val="5200"/>
+              <a:buFont typeface="Oswald Medium"/>
+              <a:buNone/>
+              <a:defRPr sz="5200" b="0" i="0" u="none" strike="noStrike" cap="none">
+                <a:solidFill>
+                  <a:schemeClr val="dk1"/>
+                </a:solidFill>
+                <a:latin typeface="Oswald Medium"/>
+                <a:ea typeface="Oswald Medium"/>
+                <a:cs typeface="Oswald Medium"/>
+                <a:sym typeface="Oswald Medium"/>
+              </a:defRPr>
+            </a:lvl5pPr>
+            <a:lvl6pPr marR="0" lvl="5" algn="ctr" rtl="0">
+              <a:lnSpc>
+                <a:spcPct val="100000"/>
+              </a:lnSpc>
+              <a:spcBef>
+                <a:spcPts val="0"/>
+              </a:spcBef>
+              <a:spcAft>
+                <a:spcPts val="0"/>
+              </a:spcAft>
+              <a:buClr>
+                <a:schemeClr val="dk1"/>
+              </a:buClr>
+              <a:buSzPts val="5200"/>
+              <a:buFont typeface="Oswald Medium"/>
+              <a:buNone/>
+              <a:defRPr sz="5200" b="0" i="0" u="none" strike="noStrike" cap="none">
+                <a:solidFill>
+                  <a:schemeClr val="dk1"/>
+                </a:solidFill>
+                <a:latin typeface="Oswald Medium"/>
+                <a:ea typeface="Oswald Medium"/>
+                <a:cs typeface="Oswald Medium"/>
+                <a:sym typeface="Oswald Medium"/>
+              </a:defRPr>
+            </a:lvl6pPr>
+            <a:lvl7pPr marR="0" lvl="6" algn="ctr" rtl="0">
+              <a:lnSpc>
+                <a:spcPct val="100000"/>
+              </a:lnSpc>
+              <a:spcBef>
+                <a:spcPts val="0"/>
+              </a:spcBef>
+              <a:spcAft>
+                <a:spcPts val="0"/>
+              </a:spcAft>
+              <a:buClr>
+                <a:schemeClr val="dk1"/>
+              </a:buClr>
+              <a:buSzPts val="5200"/>
+              <a:buFont typeface="Oswald Medium"/>
+              <a:buNone/>
+              <a:defRPr sz="5200" b="0" i="0" u="none" strike="noStrike" cap="none">
+                <a:solidFill>
+                  <a:schemeClr val="dk1"/>
+                </a:solidFill>
+                <a:latin typeface="Oswald Medium"/>
+                <a:ea typeface="Oswald Medium"/>
+                <a:cs typeface="Oswald Medium"/>
+                <a:sym typeface="Oswald Medium"/>
+              </a:defRPr>
+            </a:lvl7pPr>
+            <a:lvl8pPr marR="0" lvl="7" algn="ctr" rtl="0">
+              <a:lnSpc>
+                <a:spcPct val="100000"/>
+              </a:lnSpc>
+              <a:spcBef>
+                <a:spcPts val="0"/>
+              </a:spcBef>
+              <a:spcAft>
+                <a:spcPts val="0"/>
+              </a:spcAft>
+              <a:buClr>
+                <a:schemeClr val="dk1"/>
+              </a:buClr>
+              <a:buSzPts val="5200"/>
+              <a:buFont typeface="Oswald Medium"/>
+              <a:buNone/>
+              <a:defRPr sz="5200" b="0" i="0" u="none" strike="noStrike" cap="none">
+                <a:solidFill>
+                  <a:schemeClr val="dk1"/>
+                </a:solidFill>
+                <a:latin typeface="Oswald Medium"/>
+                <a:ea typeface="Oswald Medium"/>
+                <a:cs typeface="Oswald Medium"/>
+                <a:sym typeface="Oswald Medium"/>
+              </a:defRPr>
+            </a:lvl8pPr>
+            <a:lvl9pPr marR="0" lvl="8" algn="ctr" rtl="0">
+              <a:lnSpc>
+                <a:spcPct val="100000"/>
+              </a:lnSpc>
+              <a:spcBef>
+                <a:spcPts val="0"/>
+              </a:spcBef>
+              <a:spcAft>
+                <a:spcPts val="0"/>
+              </a:spcAft>
+              <a:buClr>
+                <a:schemeClr val="dk1"/>
+              </a:buClr>
+              <a:buSzPts val="5200"/>
+              <a:buFont typeface="Oswald Medium"/>
+              <a:buNone/>
+              <a:defRPr sz="5200" b="0" i="0" u="none" strike="noStrike" cap="none">
+                <a:solidFill>
+                  <a:schemeClr val="dk1"/>
+                </a:solidFill>
+                <a:latin typeface="Oswald Medium"/>
+                <a:ea typeface="Oswald Medium"/>
+                <a:cs typeface="Oswald Medium"/>
+                <a:sym typeface="Oswald Medium"/>
+              </a:defRPr>
+            </a:lvl9pPr>
+          </a:lstStyle>
+          <a:p>
+            <a:r>
+              <a:rPr lang="en-US" sz="9600" b="1" dirty="0">
+                <a:solidFill>
+                  <a:schemeClr val="bg1"/>
+                </a:solidFill>
+                <a:latin typeface="Bahnschrift SemiLight Condensed" panose="020B0502040204020203" pitchFamily="34" charset="0"/>
+              </a:rPr>
+              <a:t>Used languages</a:t>
+            </a:r>
+            <a:endParaRPr lang="bg-BG" sz="9600" b="1" dirty="0">
+              <a:solidFill>
+                <a:schemeClr val="bg1"/>
+              </a:solidFill>
+              <a:latin typeface="Bahnschrift SemiLight Condensed" panose="020B0502040204020203" pitchFamily="34" charset="0"/>
+            </a:endParaRPr>
+          </a:p>
+        </p:txBody>
+      </p:sp>
+      <p:pic>
+        <p:nvPicPr>
+          <p:cNvPr id="10" name="Picture 9">
+            <a:extLst>
+              <a:ext uri="{FF2B5EF4-FFF2-40B4-BE49-F238E27FC236}">
+                <a16:creationId xmlns:a16="http://schemas.microsoft.com/office/drawing/2014/main" id="{A164851B-D43B-462A-A858-FF56E287379F}"/>
+              </a:ext>
+            </a:extLst>
+          </p:cNvPr>
+          <p:cNvPicPr>
+            <a:picLocks noChangeAspect="1"/>
+          </p:cNvPicPr>
+          <p:nvPr/>
+        </p:nvPicPr>
+        <p:blipFill>
+          <a:blip r:embed="rId4"/>
+          <a:stretch>
+            <a:fillRect/>
+          </a:stretch>
+        </p:blipFill>
+        <p:spPr>
+          <a:xfrm>
+            <a:off x="6708242" y="1933898"/>
+            <a:ext cx="1241821" cy="1241821"/>
+          </a:xfrm>
+          <a:prstGeom prst="rect">
+            <a:avLst/>
+          </a:prstGeom>
+        </p:spPr>
+      </p:pic>
+      <p:pic>
+        <p:nvPicPr>
+          <p:cNvPr id="12" name="Picture 11">
+            <a:extLst>
+              <a:ext uri="{FF2B5EF4-FFF2-40B4-BE49-F238E27FC236}">
+                <a16:creationId xmlns:a16="http://schemas.microsoft.com/office/drawing/2014/main" id="{A70EAADC-576E-4C93-937A-3DDC34FDB73E}"/>
+              </a:ext>
+            </a:extLst>
+          </p:cNvPr>
+          <p:cNvPicPr>
+            <a:picLocks noChangeAspect="1"/>
+          </p:cNvPicPr>
+          <p:nvPr/>
+        </p:nvPicPr>
+        <p:blipFill>
+          <a:blip r:embed="rId5"/>
+          <a:stretch>
+            <a:fillRect/>
+          </a:stretch>
+        </p:blipFill>
+        <p:spPr>
+          <a:xfrm>
+            <a:off x="4087454" y="1950838"/>
+            <a:ext cx="1241822" cy="1241822"/>
+          </a:xfrm>
+          <a:prstGeom prst="rect">
+            <a:avLst/>
+          </a:prstGeom>
+        </p:spPr>
+      </p:pic>
+      <p:pic>
+        <p:nvPicPr>
+          <p:cNvPr id="14" name="Picture 13">
+            <a:extLst>
+              <a:ext uri="{FF2B5EF4-FFF2-40B4-BE49-F238E27FC236}">
+                <a16:creationId xmlns:a16="http://schemas.microsoft.com/office/drawing/2014/main" id="{9974C8F9-F1A0-4688-945A-0E568E204CE9}"/>
+              </a:ext>
+            </a:extLst>
+          </p:cNvPr>
+          <p:cNvPicPr>
+            <a:picLocks noChangeAspect="1"/>
+          </p:cNvPicPr>
+          <p:nvPr/>
+        </p:nvPicPr>
+        <p:blipFill>
+          <a:blip r:embed="rId6"/>
+          <a:stretch>
+            <a:fillRect/>
+          </a:stretch>
+        </p:blipFill>
+        <p:spPr>
+          <a:xfrm>
+            <a:off x="3076232" y="3433018"/>
+            <a:ext cx="1011222" cy="1117399"/>
+          </a:xfrm>
+          <a:prstGeom prst="rect">
+            <a:avLst/>
+          </a:prstGeom>
         </p:spPr>
       </p:pic>
     </p:spTree>
@@ -12426,42 +13737,6 @@
           <a:chExt cx="0" cy="0"/>
         </a:xfrm>
       </p:grpSpPr>
-      <p:sp>
-        <p:nvSpPr>
-          <p:cNvPr id="2" name="Title 1">
-            <a:extLst>
-              <a:ext uri="{FF2B5EF4-FFF2-40B4-BE49-F238E27FC236}">
-                <a16:creationId xmlns:a16="http://schemas.microsoft.com/office/drawing/2014/main" id="{D2D06F14-133A-DC92-D5BC-5BF9CBD24F9C}"/>
-              </a:ext>
-            </a:extLst>
-          </p:cNvPr>
-          <p:cNvSpPr>
-            <a:spLocks noGrp="1"/>
-          </p:cNvSpPr>
-          <p:nvPr>
-            <p:ph type="ctrTitle"/>
-          </p:nvPr>
-        </p:nvSpPr>
-        <p:spPr>
-          <a:xfrm>
-            <a:off x="2788606" y="586172"/>
-            <a:ext cx="3566786" cy="1062567"/>
-          </a:xfrm>
-        </p:spPr>
-        <p:txBody>
-          <a:bodyPr>
-            <a:normAutofit/>
-          </a:bodyPr>
-          <a:lstStyle/>
-          <a:p>
-            <a:r>
-              <a:rPr lang="en-US" sz="2800" b="1" dirty="0"/>
-              <a:t>Used Tools</a:t>
-            </a:r>
-            <a:endParaRPr lang="bg-BG" sz="2800" b="1" dirty="0"/>
-          </a:p>
-        </p:txBody>
-      </p:sp>
       <p:pic>
         <p:nvPicPr>
           <p:cNvPr id="7" name="Picture 38" descr="Visual Studio logo and symbol, meaning, history, PNG">
@@ -12808,6 +14083,15 @@
         <p:blipFill>
           <a:blip r:embed="rId9">
             <a:extLst>
+              <a:ext uri="{BEBA8EAE-BF5A-486C-A8C5-ECC9F3942E4B}">
+                <a14:imgProps xmlns:a14="http://schemas.microsoft.com/office/drawing/2010/main">
+                  <a14:imgLayer r:embed="rId10">
+                    <a14:imgEffect>
+                      <a14:artisticPhotocopy/>
+                    </a14:imgEffect>
+                  </a14:imgLayer>
+                </a14:imgProps>
+              </a:ext>
               <a:ext uri="{28A0092B-C50C-407E-A947-70E740481C1C}">
                 <a14:useLocalDpi xmlns:a14="http://schemas.microsoft.com/office/drawing/2010/main" val="0"/>
               </a:ext>
@@ -12827,15 +14111,6 @@
             <a:avLst/>
           </a:prstGeom>
           <a:noFill/>
-          <a:extLst>
-            <a:ext uri="{909E8E84-426E-40DD-AFC4-6F175D3DCCD1}">
-              <a14:hiddenFill xmlns:a14="http://schemas.microsoft.com/office/drawing/2010/main">
-                <a:solidFill>
-                  <a:srgbClr val="FFFFFF"/>
-                </a:solidFill>
-              </a14:hiddenFill>
-            </a:ext>
-          </a:extLst>
         </p:spPr>
       </p:pic>
       <p:pic>
@@ -12853,7 +14128,7 @@
           <p:nvPr/>
         </p:nvPicPr>
         <p:blipFill>
-          <a:blip r:embed="rId10">
+          <a:blip r:embed="rId11">
             <a:extLst>
               <a:ext uri="{28A0092B-C50C-407E-A947-70E740481C1C}">
                 <a14:useLocalDpi xmlns:a14="http://schemas.microsoft.com/office/drawing/2010/main" val="0"/>
@@ -12885,6 +14160,303 @@
           </a:extLst>
         </p:spPr>
       </p:pic>
+      <p:sp>
+        <p:nvSpPr>
+          <p:cNvPr id="17" name="Title 1">
+            <a:extLst>
+              <a:ext uri="{FF2B5EF4-FFF2-40B4-BE49-F238E27FC236}">
+                <a16:creationId xmlns:a16="http://schemas.microsoft.com/office/drawing/2014/main" id="{F9C9D4BB-07F1-4CCA-8B52-984A0EE4D71B}"/>
+              </a:ext>
+            </a:extLst>
+          </p:cNvPr>
+          <p:cNvSpPr txBox="1">
+            <a:spLocks/>
+          </p:cNvSpPr>
+          <p:nvPr/>
+        </p:nvSpPr>
+        <p:spPr>
+          <a:xfrm>
+            <a:off x="1142998" y="9222"/>
+            <a:ext cx="6858000" cy="1742905"/>
+          </a:xfrm>
+          <a:prstGeom prst="rect">
+            <a:avLst/>
+          </a:prstGeom>
+          <a:noFill/>
+          <a:ln>
+            <a:noFill/>
+          </a:ln>
+        </p:spPr>
+        <p:txBody>
+          <a:bodyPr spcFirstLastPara="1" wrap="square" lIns="91425" tIns="91425" rIns="91425" bIns="91425" anchor="b" anchorCtr="0">
+            <a:normAutofit fontScale="97500"/>
+          </a:bodyPr>
+          <a:lstStyle>
+            <a:defPPr marR="0" lvl="0" algn="l" rtl="0">
+              <a:lnSpc>
+                <a:spcPct val="100000"/>
+              </a:lnSpc>
+              <a:spcBef>
+                <a:spcPts val="0"/>
+              </a:spcBef>
+              <a:spcAft>
+                <a:spcPts val="0"/>
+              </a:spcAft>
+            </a:defPPr>
+            <a:lvl1pPr marR="0" lvl="0" algn="ctr" rtl="0">
+              <a:lnSpc>
+                <a:spcPct val="100000"/>
+              </a:lnSpc>
+              <a:spcBef>
+                <a:spcPts val="0"/>
+              </a:spcBef>
+              <a:spcAft>
+                <a:spcPts val="0"/>
+              </a:spcAft>
+              <a:buClr>
+                <a:schemeClr val="dk1"/>
+              </a:buClr>
+              <a:buSzPts val="5200"/>
+              <a:buFont typeface="Oswald Medium"/>
+              <a:buNone/>
+              <a:defRPr sz="6600" b="0" i="0" u="none" strike="noStrike" cap="none">
+                <a:solidFill>
+                  <a:schemeClr val="dk1"/>
+                </a:solidFill>
+                <a:latin typeface="Oswald Medium"/>
+                <a:ea typeface="Oswald Medium"/>
+                <a:cs typeface="Oswald Medium"/>
+                <a:sym typeface="Oswald Medium"/>
+              </a:defRPr>
+            </a:lvl1pPr>
+            <a:lvl2pPr marR="0" lvl="1" algn="ctr" rtl="0">
+              <a:lnSpc>
+                <a:spcPct val="100000"/>
+              </a:lnSpc>
+              <a:spcBef>
+                <a:spcPts val="0"/>
+              </a:spcBef>
+              <a:spcAft>
+                <a:spcPts val="0"/>
+              </a:spcAft>
+              <a:buClr>
+                <a:schemeClr val="dk1"/>
+              </a:buClr>
+              <a:buSzPts val="5200"/>
+              <a:buFont typeface="Oswald Medium"/>
+              <a:buNone/>
+              <a:defRPr sz="5200" b="0" i="0" u="none" strike="noStrike" cap="none">
+                <a:solidFill>
+                  <a:schemeClr val="dk1"/>
+                </a:solidFill>
+                <a:latin typeface="Oswald Medium"/>
+                <a:ea typeface="Oswald Medium"/>
+                <a:cs typeface="Oswald Medium"/>
+                <a:sym typeface="Oswald Medium"/>
+              </a:defRPr>
+            </a:lvl2pPr>
+            <a:lvl3pPr marR="0" lvl="2" algn="ctr" rtl="0">
+              <a:lnSpc>
+                <a:spcPct val="100000"/>
+              </a:lnSpc>
+              <a:spcBef>
+                <a:spcPts val="0"/>
+              </a:spcBef>
+              <a:spcAft>
+                <a:spcPts val="0"/>
+              </a:spcAft>
+              <a:buClr>
+                <a:schemeClr val="dk1"/>
+              </a:buClr>
+              <a:buSzPts val="5200"/>
+              <a:buFont typeface="Oswald Medium"/>
+              <a:buNone/>
+              <a:defRPr sz="5200" b="0" i="0" u="none" strike="noStrike" cap="none">
+                <a:solidFill>
+                  <a:schemeClr val="dk1"/>
+                </a:solidFill>
+                <a:latin typeface="Oswald Medium"/>
+                <a:ea typeface="Oswald Medium"/>
+                <a:cs typeface="Oswald Medium"/>
+                <a:sym typeface="Oswald Medium"/>
+              </a:defRPr>
+            </a:lvl3pPr>
+            <a:lvl4pPr marR="0" lvl="3" algn="ctr" rtl="0">
+              <a:lnSpc>
+                <a:spcPct val="100000"/>
+              </a:lnSpc>
+              <a:spcBef>
+                <a:spcPts val="0"/>
+              </a:spcBef>
+              <a:spcAft>
+                <a:spcPts val="0"/>
+              </a:spcAft>
+              <a:buClr>
+                <a:schemeClr val="dk1"/>
+              </a:buClr>
+              <a:buSzPts val="5200"/>
+              <a:buFont typeface="Oswald Medium"/>
+              <a:buNone/>
+              <a:defRPr sz="5200" b="0" i="0" u="none" strike="noStrike" cap="none">
+                <a:solidFill>
+                  <a:schemeClr val="dk1"/>
+                </a:solidFill>
+                <a:latin typeface="Oswald Medium"/>
+                <a:ea typeface="Oswald Medium"/>
+                <a:cs typeface="Oswald Medium"/>
+                <a:sym typeface="Oswald Medium"/>
+              </a:defRPr>
+            </a:lvl4pPr>
+            <a:lvl5pPr marR="0" lvl="4" algn="ctr" rtl="0">
+              <a:lnSpc>
+                <a:spcPct val="100000"/>
+              </a:lnSpc>
+              <a:spcBef>
+                <a:spcPts val="0"/>
+              </a:spcBef>
+              <a:spcAft>
+                <a:spcPts val="0"/>
+              </a:spcAft>
+              <a:buClr>
+                <a:schemeClr val="dk1"/>
+              </a:buClr>
+              <a:buSzPts val="5200"/>
+              <a:buFont typeface="Oswald Medium"/>
+              <a:buNone/>
+              <a:defRPr sz="5200" b="0" i="0" u="none" strike="noStrike" cap="none">
+                <a:solidFill>
+                  <a:schemeClr val="dk1"/>
+                </a:solidFill>
+                <a:latin typeface="Oswald Medium"/>
+                <a:ea typeface="Oswald Medium"/>
+                <a:cs typeface="Oswald Medium"/>
+                <a:sym typeface="Oswald Medium"/>
+              </a:defRPr>
+            </a:lvl5pPr>
+            <a:lvl6pPr marR="0" lvl="5" algn="ctr" rtl="0">
+              <a:lnSpc>
+                <a:spcPct val="100000"/>
+              </a:lnSpc>
+              <a:spcBef>
+                <a:spcPts val="0"/>
+              </a:spcBef>
+              <a:spcAft>
+                <a:spcPts val="0"/>
+              </a:spcAft>
+              <a:buClr>
+                <a:schemeClr val="dk1"/>
+              </a:buClr>
+              <a:buSzPts val="5200"/>
+              <a:buFont typeface="Oswald Medium"/>
+              <a:buNone/>
+              <a:defRPr sz="5200" b="0" i="0" u="none" strike="noStrike" cap="none">
+                <a:solidFill>
+                  <a:schemeClr val="dk1"/>
+                </a:solidFill>
+                <a:latin typeface="Oswald Medium"/>
+                <a:ea typeface="Oswald Medium"/>
+                <a:cs typeface="Oswald Medium"/>
+                <a:sym typeface="Oswald Medium"/>
+              </a:defRPr>
+            </a:lvl6pPr>
+            <a:lvl7pPr marR="0" lvl="6" algn="ctr" rtl="0">
+              <a:lnSpc>
+                <a:spcPct val="100000"/>
+              </a:lnSpc>
+              <a:spcBef>
+                <a:spcPts val="0"/>
+              </a:spcBef>
+              <a:spcAft>
+                <a:spcPts val="0"/>
+              </a:spcAft>
+              <a:buClr>
+                <a:schemeClr val="dk1"/>
+              </a:buClr>
+              <a:buSzPts val="5200"/>
+              <a:buFont typeface="Oswald Medium"/>
+              <a:buNone/>
+              <a:defRPr sz="5200" b="0" i="0" u="none" strike="noStrike" cap="none">
+                <a:solidFill>
+                  <a:schemeClr val="dk1"/>
+                </a:solidFill>
+                <a:latin typeface="Oswald Medium"/>
+                <a:ea typeface="Oswald Medium"/>
+                <a:cs typeface="Oswald Medium"/>
+                <a:sym typeface="Oswald Medium"/>
+              </a:defRPr>
+            </a:lvl7pPr>
+            <a:lvl8pPr marR="0" lvl="7" algn="ctr" rtl="0">
+              <a:lnSpc>
+                <a:spcPct val="100000"/>
+              </a:lnSpc>
+              <a:spcBef>
+                <a:spcPts val="0"/>
+              </a:spcBef>
+              <a:spcAft>
+                <a:spcPts val="0"/>
+              </a:spcAft>
+              <a:buClr>
+                <a:schemeClr val="dk1"/>
+              </a:buClr>
+              <a:buSzPts val="5200"/>
+              <a:buFont typeface="Oswald Medium"/>
+              <a:buNone/>
+              <a:defRPr sz="5200" b="0" i="0" u="none" strike="noStrike" cap="none">
+                <a:solidFill>
+                  <a:schemeClr val="dk1"/>
+                </a:solidFill>
+                <a:latin typeface="Oswald Medium"/>
+                <a:ea typeface="Oswald Medium"/>
+                <a:cs typeface="Oswald Medium"/>
+                <a:sym typeface="Oswald Medium"/>
+              </a:defRPr>
+            </a:lvl8pPr>
+            <a:lvl9pPr marR="0" lvl="8" algn="ctr" rtl="0">
+              <a:lnSpc>
+                <a:spcPct val="100000"/>
+              </a:lnSpc>
+              <a:spcBef>
+                <a:spcPts val="0"/>
+              </a:spcBef>
+              <a:spcAft>
+                <a:spcPts val="0"/>
+              </a:spcAft>
+              <a:buClr>
+                <a:schemeClr val="dk1"/>
+              </a:buClr>
+              <a:buSzPts val="5200"/>
+              <a:buFont typeface="Oswald Medium"/>
+              <a:buNone/>
+              <a:defRPr sz="5200" b="0" i="0" u="none" strike="noStrike" cap="none">
+                <a:solidFill>
+                  <a:schemeClr val="dk1"/>
+                </a:solidFill>
+                <a:latin typeface="Oswald Medium"/>
+                <a:ea typeface="Oswald Medium"/>
+                <a:cs typeface="Oswald Medium"/>
+                <a:sym typeface="Oswald Medium"/>
+              </a:defRPr>
+            </a:lvl9pPr>
+          </a:lstStyle>
+          <a:p>
+            <a:r>
+              <a:rPr lang="en-US" sz="9600" b="1" dirty="0">
+                <a:solidFill>
+                  <a:schemeClr val="bg1"/>
+                </a:solidFill>
+                <a:latin typeface="Bahnschrift SemiLight Condensed" panose="020B0502040204020203" pitchFamily="34" charset="0"/>
+              </a:rPr>
+              <a:t>Used tools</a:t>
+            </a:r>
+            <a:endParaRPr lang="bg-BG" sz="9600" b="1" dirty="0">
+              <a:solidFill>
+                <a:schemeClr val="bg1"/>
+              </a:solidFill>
+              <a:latin typeface="Bahnschrift SemiLight Condensed" panose="020B0502040204020203" pitchFamily="34" charset="0"/>
+            </a:endParaRPr>
+          </a:p>
+        </p:txBody>
+      </p:sp>
     </p:spTree>
     <p:extLst>
       <p:ext uri="{BB962C8B-B14F-4D97-AF65-F5344CB8AC3E}">
@@ -12933,58 +14505,34 @@
         </p:nvSpPr>
         <p:spPr>
           <a:xfrm>
-            <a:off x="1143000" y="208464"/>
+            <a:off x="1243852" y="2319653"/>
             <a:ext cx="6858000" cy="1742905"/>
           </a:xfrm>
         </p:spPr>
         <p:txBody>
           <a:bodyPr>
-            <a:normAutofit fontScale="90000"/>
+            <a:noAutofit/>
           </a:bodyPr>
           <a:lstStyle/>
           <a:p>
             <a:r>
-              <a:rPr lang="en-US" b="1" dirty="0">
-                <a:latin typeface="+mj-lt"/>
+              <a:rPr lang="en-US" sz="9600" b="1" dirty="0">
+                <a:solidFill>
+                  <a:schemeClr val="bg1"/>
+                </a:solidFill>
+                <a:latin typeface="Bahnschrift SemiLight Condensed" panose="020B0502040204020203" pitchFamily="34" charset="0"/>
               </a:rPr>
-              <a:t>Let’s show you our game</a:t>
+              <a:t>Let’s continue to our game</a:t>
             </a:r>
-            <a:endParaRPr lang="bg-BG" b="1" dirty="0">
-              <a:latin typeface="+mj-lt"/>
+            <a:endParaRPr lang="bg-BG" sz="9600" b="1" dirty="0">
+              <a:solidFill>
+                <a:schemeClr val="bg1"/>
+              </a:solidFill>
+              <a:latin typeface="Bahnschrift SemiLight Condensed" panose="020B0502040204020203" pitchFamily="34" charset="0"/>
             </a:endParaRPr>
           </a:p>
         </p:txBody>
       </p:sp>
-      <p:pic>
-        <p:nvPicPr>
-          <p:cNvPr id="4" name="Content Placeholder 10">
-            <a:extLst>
-              <a:ext uri="{FF2B5EF4-FFF2-40B4-BE49-F238E27FC236}">
-                <a16:creationId xmlns:a16="http://schemas.microsoft.com/office/drawing/2014/main" id="{FBF14B18-E376-A84E-D0F4-2D47604B5A20}"/>
-              </a:ext>
-            </a:extLst>
-          </p:cNvPr>
-          <p:cNvPicPr>
-            <a:picLocks noChangeAspect="1"/>
-          </p:cNvPicPr>
-          <p:nvPr/>
-        </p:nvPicPr>
-        <p:blipFill>
-          <a:blip r:embed="rId2"/>
-          <a:stretch>
-            <a:fillRect/>
-          </a:stretch>
-        </p:blipFill>
-        <p:spPr>
-          <a:xfrm>
-            <a:off x="2940248" y="1790658"/>
-            <a:ext cx="3263504" cy="3263504"/>
-          </a:xfrm>
-          <a:prstGeom prst="rect">
-            <a:avLst/>
-          </a:prstGeom>
-        </p:spPr>
-      </p:pic>
     </p:spTree>
     <p:extLst>
       <p:ext uri="{BB962C8B-B14F-4D97-AF65-F5344CB8AC3E}">

</xml_diff>